<commit_message>
didn't really do anything
</commit_message>
<xml_diff>
--- a/Non-Technical.pptx
+++ b/Non-Technical.pptx
@@ -6,6 +6,7 @@
   </p:sldMasterIdLst>
   <p:sldIdLst>
     <p:sldId id="256" r:id="rId2"/>
+    <p:sldId id="257" r:id="rId3"/>
   </p:sldIdLst>
   <p:sldSz cx="12192000" cy="6858000"/>
   <p:notesSz cx="6858000" cy="9144000"/>
@@ -104,11 +105,47 @@
       </a:defRPr>
     </a:lvl9pPr>
   </p:defaultTextStyle>
+  <p:extLst>
+    <p:ext uri="{EFAFB233-063F-42B5-8137-9DF3F51BA10A}">
+      <p15:sldGuideLst xmlns:p15="http://schemas.microsoft.com/office/powerpoint/2012/main"/>
+    </p:ext>
+  </p:extLst>
 </p:presentation>
 </file>
 
 <file path=ppt/changesInfos/changesInfo1.xml><?xml version="1.0" encoding="utf-8"?>
 <pc:chgInfo xmlns:a="http://schemas.openxmlformats.org/drawingml/2006/main" xmlns:r="http://schemas.openxmlformats.org/officeDocument/2006/relationships" xmlns:ac="http://schemas.microsoft.com/office/drawing/2013/main/command" xmlns:pc="http://schemas.microsoft.com/office/powerpoint/2013/main/command">
+  <pc:docChgLst>
+    <pc:chgData name="Michael" userId="0df92e9667c24698" providerId="LiveId" clId="{1F99F48F-5B65-4770-B2EE-DE9434FFD723}"/>
+    <pc:docChg chg="addSld modSld">
+      <pc:chgData name="Michael" userId="0df92e9667c24698" providerId="LiveId" clId="{1F99F48F-5B65-4770-B2EE-DE9434FFD723}" dt="2020-08-03T01:35:23.107" v="17" actId="680"/>
+      <pc:docMkLst>
+        <pc:docMk/>
+      </pc:docMkLst>
+      <pc:sldChg chg="modSp mod">
+        <pc:chgData name="Michael" userId="0df92e9667c24698" providerId="LiveId" clId="{1F99F48F-5B65-4770-B2EE-DE9434FFD723}" dt="2020-08-03T01:35:04.217" v="16" actId="20577"/>
+        <pc:sldMkLst>
+          <pc:docMk/>
+          <pc:sldMk cId="1265917787" sldId="256"/>
+        </pc:sldMkLst>
+        <pc:spChg chg="mod">
+          <ac:chgData name="Michael" userId="0df92e9667c24698" providerId="LiveId" clId="{1F99F48F-5B65-4770-B2EE-DE9434FFD723}" dt="2020-08-03T01:35:04.217" v="16" actId="20577"/>
+          <ac:spMkLst>
+            <pc:docMk/>
+            <pc:sldMk cId="1265917787" sldId="256"/>
+            <ac:spMk id="2" creationId="{6E861DEA-96B7-410B-ADA5-587204502AF3}"/>
+          </ac:spMkLst>
+        </pc:spChg>
+      </pc:sldChg>
+      <pc:sldChg chg="new">
+        <pc:chgData name="Michael" userId="0df92e9667c24698" providerId="LiveId" clId="{1F99F48F-5B65-4770-B2EE-DE9434FFD723}" dt="2020-08-03T01:35:23.107" v="17" actId="680"/>
+        <pc:sldMkLst>
+          <pc:docMk/>
+          <pc:sldMk cId="2709198907" sldId="257"/>
+        </pc:sldMkLst>
+      </pc:sldChg>
+    </pc:docChg>
+  </pc:docChgLst>
   <pc:docChgLst>
     <pc:chgData name="Michael" userId="0df92e9667c24698" providerId="LiveId" clId="{51027CB0-4EFB-41A8-88F7-48E0C374C192}"/>
     <pc:docChg chg="addSld">
@@ -275,7 +312,7 @@
           <a:p>
             <a:fld id="{A310A56D-2A73-4214-BDEC-EE3DDD3E3C39}" type="datetimeFigureOut">
               <a:rPr lang="en-US" smtClean="0"/>
-              <a:t>7/31/2020</a:t>
+              <a:t>8/2/2020</a:t>
             </a:fld>
             <a:endParaRPr lang="en-US"/>
           </a:p>
@@ -473,7 +510,7 @@
           <a:p>
             <a:fld id="{A310A56D-2A73-4214-BDEC-EE3DDD3E3C39}" type="datetimeFigureOut">
               <a:rPr lang="en-US" smtClean="0"/>
-              <a:t>7/31/2020</a:t>
+              <a:t>8/2/2020</a:t>
             </a:fld>
             <a:endParaRPr lang="en-US"/>
           </a:p>
@@ -681,7 +718,7 @@
           <a:p>
             <a:fld id="{A310A56D-2A73-4214-BDEC-EE3DDD3E3C39}" type="datetimeFigureOut">
               <a:rPr lang="en-US" smtClean="0"/>
-              <a:t>7/31/2020</a:t>
+              <a:t>8/2/2020</a:t>
             </a:fld>
             <a:endParaRPr lang="en-US"/>
           </a:p>
@@ -879,7 +916,7 @@
           <a:p>
             <a:fld id="{A310A56D-2A73-4214-BDEC-EE3DDD3E3C39}" type="datetimeFigureOut">
               <a:rPr lang="en-US" smtClean="0"/>
-              <a:t>7/31/2020</a:t>
+              <a:t>8/2/2020</a:t>
             </a:fld>
             <a:endParaRPr lang="en-US"/>
           </a:p>
@@ -1154,7 +1191,7 @@
           <a:p>
             <a:fld id="{A310A56D-2A73-4214-BDEC-EE3DDD3E3C39}" type="datetimeFigureOut">
               <a:rPr lang="en-US" smtClean="0"/>
-              <a:t>7/31/2020</a:t>
+              <a:t>8/2/2020</a:t>
             </a:fld>
             <a:endParaRPr lang="en-US"/>
           </a:p>
@@ -1419,7 +1456,7 @@
           <a:p>
             <a:fld id="{A310A56D-2A73-4214-BDEC-EE3DDD3E3C39}" type="datetimeFigureOut">
               <a:rPr lang="en-US" smtClean="0"/>
-              <a:t>7/31/2020</a:t>
+              <a:t>8/2/2020</a:t>
             </a:fld>
             <a:endParaRPr lang="en-US"/>
           </a:p>
@@ -1831,7 +1868,7 @@
           <a:p>
             <a:fld id="{A310A56D-2A73-4214-BDEC-EE3DDD3E3C39}" type="datetimeFigureOut">
               <a:rPr lang="en-US" smtClean="0"/>
-              <a:t>7/31/2020</a:t>
+              <a:t>8/2/2020</a:t>
             </a:fld>
             <a:endParaRPr lang="en-US"/>
           </a:p>
@@ -1972,7 +2009,7 @@
           <a:p>
             <a:fld id="{A310A56D-2A73-4214-BDEC-EE3DDD3E3C39}" type="datetimeFigureOut">
               <a:rPr lang="en-US" smtClean="0"/>
-              <a:t>7/31/2020</a:t>
+              <a:t>8/2/2020</a:t>
             </a:fld>
             <a:endParaRPr lang="en-US"/>
           </a:p>
@@ -2085,7 +2122,7 @@
           <a:p>
             <a:fld id="{A310A56D-2A73-4214-BDEC-EE3DDD3E3C39}" type="datetimeFigureOut">
               <a:rPr lang="en-US" smtClean="0"/>
-              <a:t>7/31/2020</a:t>
+              <a:t>8/2/2020</a:t>
             </a:fld>
             <a:endParaRPr lang="en-US"/>
           </a:p>
@@ -2396,7 +2433,7 @@
           <a:p>
             <a:fld id="{A310A56D-2A73-4214-BDEC-EE3DDD3E3C39}" type="datetimeFigureOut">
               <a:rPr lang="en-US" smtClean="0"/>
-              <a:t>7/31/2020</a:t>
+              <a:t>8/2/2020</a:t>
             </a:fld>
             <a:endParaRPr lang="en-US"/>
           </a:p>
@@ -2684,7 +2721,7 @@
           <a:p>
             <a:fld id="{A310A56D-2A73-4214-BDEC-EE3DDD3E3C39}" type="datetimeFigureOut">
               <a:rPr lang="en-US" smtClean="0"/>
-              <a:t>7/31/2020</a:t>
+              <a:t>8/2/2020</a:t>
             </a:fld>
             <a:endParaRPr lang="en-US"/>
           </a:p>
@@ -2925,7 +2962,7 @@
           <a:p>
             <a:fld id="{A310A56D-2A73-4214-BDEC-EE3DDD3E3C39}" type="datetimeFigureOut">
               <a:rPr lang="en-US" smtClean="0"/>
-              <a:t>7/31/2020</a:t>
+              <a:t>8/2/2020</a:t>
             </a:fld>
             <a:endParaRPr lang="en-US"/>
           </a:p>
@@ -3363,7 +3400,10 @@
           <a:bodyPr/>
           <a:lstStyle/>
           <a:p>
-            <a:endParaRPr lang="en-US"/>
+            <a:r>
+              <a:rPr lang="en-US" dirty="0"/>
+              <a:t>King County Homes</a:t>
+            </a:r>
           </a:p>
         </p:txBody>
       </p:sp>
@@ -3388,7 +3428,7 @@
           <a:bodyPr/>
           <a:lstStyle/>
           <a:p>
-            <a:endParaRPr lang="en-US"/>
+            <a:endParaRPr lang="en-US" dirty="0"/>
           </a:p>
         </p:txBody>
       </p:sp>
@@ -3396,6 +3436,86 @@
     <p:extLst>
       <p:ext uri="{BB962C8B-B14F-4D97-AF65-F5344CB8AC3E}">
         <p14:creationId xmlns:p14="http://schemas.microsoft.com/office/powerpoint/2010/main" val="1265917787"/>
+      </p:ext>
+    </p:extLst>
+  </p:cSld>
+  <p:clrMapOvr>
+    <a:masterClrMapping/>
+  </p:clrMapOvr>
+</p:sld>
+</file>
+
+<file path=ppt/slides/slide2.xml><?xml version="1.0" encoding="utf-8"?>
+<p:sld xmlns:a="http://schemas.openxmlformats.org/drawingml/2006/main" xmlns:r="http://schemas.openxmlformats.org/officeDocument/2006/relationships" xmlns:p="http://schemas.openxmlformats.org/presentationml/2006/main">
+  <p:cSld>
+    <p:spTree>
+      <p:nvGrpSpPr>
+        <p:cNvPr id="1" name=""/>
+        <p:cNvGrpSpPr/>
+        <p:nvPr/>
+      </p:nvGrpSpPr>
+      <p:grpSpPr>
+        <a:xfrm>
+          <a:off x="0" y="0"/>
+          <a:ext cx="0" cy="0"/>
+          <a:chOff x="0" y="0"/>
+          <a:chExt cx="0" cy="0"/>
+        </a:xfrm>
+      </p:grpSpPr>
+      <p:sp>
+        <p:nvSpPr>
+          <p:cNvPr id="2" name="Title 1">
+            <a:extLst>
+              <a:ext uri="{FF2B5EF4-FFF2-40B4-BE49-F238E27FC236}">
+                <a16:creationId xmlns:a16="http://schemas.microsoft.com/office/drawing/2014/main" id="{A34B8A40-B7D8-4B6E-8F77-60C268CBF4ED}"/>
+              </a:ext>
+            </a:extLst>
+          </p:cNvPr>
+          <p:cNvSpPr>
+            <a:spLocks noGrp="1"/>
+          </p:cNvSpPr>
+          <p:nvPr>
+            <p:ph type="title"/>
+          </p:nvPr>
+        </p:nvSpPr>
+        <p:spPr/>
+        <p:txBody>
+          <a:bodyPr/>
+          <a:lstStyle/>
+          <a:p>
+            <a:endParaRPr lang="en-US"/>
+          </a:p>
+        </p:txBody>
+      </p:sp>
+      <p:sp>
+        <p:nvSpPr>
+          <p:cNvPr id="3" name="Content Placeholder 2">
+            <a:extLst>
+              <a:ext uri="{FF2B5EF4-FFF2-40B4-BE49-F238E27FC236}">
+                <a16:creationId xmlns:a16="http://schemas.microsoft.com/office/drawing/2014/main" id="{788DC7C3-148B-4450-96FA-03F96F3D79C9}"/>
+              </a:ext>
+            </a:extLst>
+          </p:cNvPr>
+          <p:cNvSpPr>
+            <a:spLocks noGrp="1"/>
+          </p:cNvSpPr>
+          <p:nvPr>
+            <p:ph idx="1"/>
+          </p:nvPr>
+        </p:nvSpPr>
+        <p:spPr/>
+        <p:txBody>
+          <a:bodyPr/>
+          <a:lstStyle/>
+          <a:p>
+            <a:endParaRPr lang="en-US"/>
+          </a:p>
+        </p:txBody>
+      </p:sp>
+    </p:spTree>
+    <p:extLst>
+      <p:ext uri="{BB962C8B-B14F-4D97-AF65-F5344CB8AC3E}">
+        <p14:creationId xmlns:p14="http://schemas.microsoft.com/office/powerpoint/2010/main" val="2709198907"/>
       </p:ext>
     </p:extLst>
   </p:cSld>

</xml_diff>

<commit_message>
generating visuals for non-technical
</commit_message>
<xml_diff>
--- a/Non-Technical.pptx
+++ b/Non-Technical.pptx
@@ -2,11 +2,13 @@
 <file path=ppt/presentation.xml><?xml version="1.0" encoding="utf-8"?>
 <p:presentation xmlns:a="http://schemas.openxmlformats.org/drawingml/2006/main" xmlns:r="http://schemas.openxmlformats.org/officeDocument/2006/relationships" xmlns:p="http://schemas.openxmlformats.org/presentationml/2006/main" saveSubsetFonts="1">
   <p:sldMasterIdLst>
-    <p:sldMasterId id="2147483648" r:id="rId1"/>
+    <p:sldMasterId id="2147483672" r:id="rId1"/>
   </p:sldMasterIdLst>
   <p:sldIdLst>
     <p:sldId id="256" r:id="rId2"/>
-    <p:sldId id="257" r:id="rId3"/>
+    <p:sldId id="258" r:id="rId3"/>
+    <p:sldId id="257" r:id="rId4"/>
+    <p:sldId id="259" r:id="rId5"/>
   </p:sldIdLst>
   <p:sldSz cx="12192000" cy="6858000"/>
   <p:notesSz cx="6858000" cy="9144000"/>
@@ -14,7 +16,7 @@
     <a:defPPr>
       <a:defRPr lang="en-US"/>
     </a:defPPr>
-    <a:lvl1pPr marL="0" algn="l" defTabSz="914400" rtl="0" eaLnBrk="1" latinLnBrk="0" hangingPunct="1">
+    <a:lvl1pPr marL="0" algn="l" defTabSz="457200" rtl="0" eaLnBrk="1" latinLnBrk="0" hangingPunct="1">
       <a:defRPr sz="1800" kern="1200">
         <a:solidFill>
           <a:schemeClr val="tx1"/>
@@ -24,7 +26,7 @@
         <a:cs typeface="+mn-cs"/>
       </a:defRPr>
     </a:lvl1pPr>
-    <a:lvl2pPr marL="457200" algn="l" defTabSz="914400" rtl="0" eaLnBrk="1" latinLnBrk="0" hangingPunct="1">
+    <a:lvl2pPr marL="457200" algn="l" defTabSz="457200" rtl="0" eaLnBrk="1" latinLnBrk="0" hangingPunct="1">
       <a:defRPr sz="1800" kern="1200">
         <a:solidFill>
           <a:schemeClr val="tx1"/>
@@ -34,7 +36,7 @@
         <a:cs typeface="+mn-cs"/>
       </a:defRPr>
     </a:lvl2pPr>
-    <a:lvl3pPr marL="914400" algn="l" defTabSz="914400" rtl="0" eaLnBrk="1" latinLnBrk="0" hangingPunct="1">
+    <a:lvl3pPr marL="914400" algn="l" defTabSz="457200" rtl="0" eaLnBrk="1" latinLnBrk="0" hangingPunct="1">
       <a:defRPr sz="1800" kern="1200">
         <a:solidFill>
           <a:schemeClr val="tx1"/>
@@ -44,7 +46,7 @@
         <a:cs typeface="+mn-cs"/>
       </a:defRPr>
     </a:lvl3pPr>
-    <a:lvl4pPr marL="1371600" algn="l" defTabSz="914400" rtl="0" eaLnBrk="1" latinLnBrk="0" hangingPunct="1">
+    <a:lvl4pPr marL="1371600" algn="l" defTabSz="457200" rtl="0" eaLnBrk="1" latinLnBrk="0" hangingPunct="1">
       <a:defRPr sz="1800" kern="1200">
         <a:solidFill>
           <a:schemeClr val="tx1"/>
@@ -54,7 +56,7 @@
         <a:cs typeface="+mn-cs"/>
       </a:defRPr>
     </a:lvl4pPr>
-    <a:lvl5pPr marL="1828800" algn="l" defTabSz="914400" rtl="0" eaLnBrk="1" latinLnBrk="0" hangingPunct="1">
+    <a:lvl5pPr marL="1828800" algn="l" defTabSz="457200" rtl="0" eaLnBrk="1" latinLnBrk="0" hangingPunct="1">
       <a:defRPr sz="1800" kern="1200">
         <a:solidFill>
           <a:schemeClr val="tx1"/>
@@ -64,7 +66,7 @@
         <a:cs typeface="+mn-cs"/>
       </a:defRPr>
     </a:lvl5pPr>
-    <a:lvl6pPr marL="2286000" algn="l" defTabSz="914400" rtl="0" eaLnBrk="1" latinLnBrk="0" hangingPunct="1">
+    <a:lvl6pPr marL="2286000" algn="l" defTabSz="457200" rtl="0" eaLnBrk="1" latinLnBrk="0" hangingPunct="1">
       <a:defRPr sz="1800" kern="1200">
         <a:solidFill>
           <a:schemeClr val="tx1"/>
@@ -74,7 +76,7 @@
         <a:cs typeface="+mn-cs"/>
       </a:defRPr>
     </a:lvl6pPr>
-    <a:lvl7pPr marL="2743200" algn="l" defTabSz="914400" rtl="0" eaLnBrk="1" latinLnBrk="0" hangingPunct="1">
+    <a:lvl7pPr marL="2743200" algn="l" defTabSz="457200" rtl="0" eaLnBrk="1" latinLnBrk="0" hangingPunct="1">
       <a:defRPr sz="1800" kern="1200">
         <a:solidFill>
           <a:schemeClr val="tx1"/>
@@ -84,7 +86,7 @@
         <a:cs typeface="+mn-cs"/>
       </a:defRPr>
     </a:lvl7pPr>
-    <a:lvl8pPr marL="3200400" algn="l" defTabSz="914400" rtl="0" eaLnBrk="1" latinLnBrk="0" hangingPunct="1">
+    <a:lvl8pPr marL="3200400" algn="l" defTabSz="457200" rtl="0" eaLnBrk="1" latinLnBrk="0" hangingPunct="1">
       <a:defRPr sz="1800" kern="1200">
         <a:solidFill>
           <a:schemeClr val="tx1"/>
@@ -94,7 +96,7 @@
         <a:cs typeface="+mn-cs"/>
       </a:defRPr>
     </a:lvl8pPr>
-    <a:lvl9pPr marL="3657600" algn="l" defTabSz="914400" rtl="0" eaLnBrk="1" latinLnBrk="0" hangingPunct="1">
+    <a:lvl9pPr marL="3657600" algn="l" defTabSz="457200" rtl="0" eaLnBrk="1" latinLnBrk="0" hangingPunct="1">
       <a:defRPr sz="1800" kern="1200">
         <a:solidFill>
           <a:schemeClr val="tx1"/>
@@ -111,6 +113,14 @@
     </p:ext>
   </p:extLst>
 </p:presentation>
+</file>
+
+<file path=ppt/revisionInfo.xml><?xml version="1.0" encoding="utf-8"?>
+<p1510:revInfo xmlns:a="http://schemas.openxmlformats.org/drawingml/2006/main" xmlns:r="http://schemas.openxmlformats.org/officeDocument/2006/relationships" xmlns:p1510="http://schemas.microsoft.com/office/powerpoint/2015/10/main">
+  <p1510:revLst>
+    <p1510:client id="{63F90B20-AD47-4B60-BE49-36ADD5B2B0D2}" v="4" dt="2020-08-07T03:59:57.121"/>
+  </p1510:revLst>
+</p1510:revInfo>
 </file>
 
 <file path=ppt/changesInfos/changesInfo1.xml><?xml version="1.0" encoding="utf-8"?>
@@ -143,6 +153,92 @@
           <pc:docMk/>
           <pc:sldMk cId="2709198907" sldId="257"/>
         </pc:sldMkLst>
+      </pc:sldChg>
+    </pc:docChg>
+  </pc:docChgLst>
+  <pc:docChgLst>
+    <pc:chgData name="Michael" userId="0df92e9667c24698" providerId="LiveId" clId="{63F90B20-AD47-4B60-BE49-36ADD5B2B0D2}"/>
+    <pc:docChg chg="undo custSel addSld modSld">
+      <pc:chgData name="Michael" userId="0df92e9667c24698" providerId="LiveId" clId="{63F90B20-AD47-4B60-BE49-36ADD5B2B0D2}" dt="2020-08-07T04:00:47.851" v="187" actId="1076"/>
+      <pc:docMkLst>
+        <pc:docMk/>
+      </pc:docMkLst>
+      <pc:sldChg chg="addSp delSp modSp mod">
+        <pc:chgData name="Michael" userId="0df92e9667c24698" providerId="LiveId" clId="{63F90B20-AD47-4B60-BE49-36ADD5B2B0D2}" dt="2020-08-07T04:00:47.851" v="187" actId="1076"/>
+        <pc:sldMkLst>
+          <pc:docMk/>
+          <pc:sldMk cId="2709198907" sldId="257"/>
+        </pc:sldMkLst>
+        <pc:spChg chg="mod">
+          <ac:chgData name="Michael" userId="0df92e9667c24698" providerId="LiveId" clId="{63F90B20-AD47-4B60-BE49-36ADD5B2B0D2}" dt="2020-08-07T03:21:20.985" v="165" actId="20577"/>
+          <ac:spMkLst>
+            <pc:docMk/>
+            <pc:sldMk cId="2709198907" sldId="257"/>
+            <ac:spMk id="2" creationId="{A34B8A40-B7D8-4B6E-8F77-60C268CBF4ED}"/>
+          </ac:spMkLst>
+        </pc:spChg>
+        <pc:spChg chg="del">
+          <ac:chgData name="Michael" userId="0df92e9667c24698" providerId="LiveId" clId="{63F90B20-AD47-4B60-BE49-36ADD5B2B0D2}" dt="2020-08-07T03:56:59.877" v="166" actId="931"/>
+          <ac:spMkLst>
+            <pc:docMk/>
+            <pc:sldMk cId="2709198907" sldId="257"/>
+            <ac:spMk id="3" creationId="{788DC7C3-148B-4450-96FA-03F96F3D79C9}"/>
+          </ac:spMkLst>
+        </pc:spChg>
+        <pc:picChg chg="add mod">
+          <ac:chgData name="Michael" userId="0df92e9667c24698" providerId="LiveId" clId="{63F90B20-AD47-4B60-BE49-36ADD5B2B0D2}" dt="2020-08-07T04:00:47.851" v="187" actId="1076"/>
+          <ac:picMkLst>
+            <pc:docMk/>
+            <pc:sldMk cId="2709198907" sldId="257"/>
+            <ac:picMk id="5" creationId="{38766B99-6144-4199-9937-F7AA9E078255}"/>
+          </ac:picMkLst>
+        </pc:picChg>
+      </pc:sldChg>
+      <pc:sldChg chg="modSp new mod">
+        <pc:chgData name="Michael" userId="0df92e9667c24698" providerId="LiveId" clId="{63F90B20-AD47-4B60-BE49-36ADD5B2B0D2}" dt="2020-08-07T03:59:57.306" v="179" actId="27636"/>
+        <pc:sldMkLst>
+          <pc:docMk/>
+          <pc:sldMk cId="470197049" sldId="258"/>
+        </pc:sldMkLst>
+        <pc:spChg chg="mod">
+          <ac:chgData name="Michael" userId="0df92e9667c24698" providerId="LiveId" clId="{63F90B20-AD47-4B60-BE49-36ADD5B2B0D2}" dt="2020-08-07T03:18:11.776" v="73" actId="20577"/>
+          <ac:spMkLst>
+            <pc:docMk/>
+            <pc:sldMk cId="470197049" sldId="258"/>
+            <ac:spMk id="2" creationId="{450A55ED-B344-4B90-8E54-3FA7DCD06411}"/>
+          </ac:spMkLst>
+        </pc:spChg>
+        <pc:spChg chg="mod">
+          <ac:chgData name="Michael" userId="0df92e9667c24698" providerId="LiveId" clId="{63F90B20-AD47-4B60-BE49-36ADD5B2B0D2}" dt="2020-08-07T03:59:57.306" v="179" actId="27636"/>
+          <ac:spMkLst>
+            <pc:docMk/>
+            <pc:sldMk cId="470197049" sldId="258"/>
+            <ac:spMk id="3" creationId="{ACE8AE74-60CA-4CC0-B9B2-DAFCEB00217C}"/>
+          </ac:spMkLst>
+        </pc:spChg>
+      </pc:sldChg>
+      <pc:sldChg chg="addSp delSp modSp new mod">
+        <pc:chgData name="Michael" userId="0df92e9667c24698" providerId="LiveId" clId="{63F90B20-AD47-4B60-BE49-36ADD5B2B0D2}" dt="2020-08-07T04:00:11.132" v="184" actId="14100"/>
+        <pc:sldMkLst>
+          <pc:docMk/>
+          <pc:sldMk cId="1022739119" sldId="259"/>
+        </pc:sldMkLst>
+        <pc:spChg chg="del">
+          <ac:chgData name="Michael" userId="0df92e9667c24698" providerId="LiveId" clId="{63F90B20-AD47-4B60-BE49-36ADD5B2B0D2}" dt="2020-08-07T03:57:17.525" v="170" actId="931"/>
+          <ac:spMkLst>
+            <pc:docMk/>
+            <pc:sldMk cId="1022739119" sldId="259"/>
+            <ac:spMk id="3" creationId="{D728B6C6-CA48-40E7-9CF8-60DCFC98566F}"/>
+          </ac:spMkLst>
+        </pc:spChg>
+        <pc:picChg chg="add mod">
+          <ac:chgData name="Michael" userId="0df92e9667c24698" providerId="LiveId" clId="{63F90B20-AD47-4B60-BE49-36ADD5B2B0D2}" dt="2020-08-07T04:00:11.132" v="184" actId="14100"/>
+          <ac:picMkLst>
+            <pc:docMk/>
+            <pc:sldMk cId="1022739119" sldId="259"/>
+            <ac:picMk id="5" creationId="{1481E1AB-C705-4D63-A70E-F14EE30A4318}"/>
+          </ac:picMkLst>
+        </pc:picChg>
       </pc:sldChg>
     </pc:docChg>
   </pc:docChgLst>
@@ -184,13 +280,7 @@
       </p:grpSpPr>
       <p:sp>
         <p:nvSpPr>
-          <p:cNvPr id="2" name="Title 1">
-            <a:extLst>
-              <a:ext uri="{FF2B5EF4-FFF2-40B4-BE49-F238E27FC236}">
-                <a16:creationId xmlns:a16="http://schemas.microsoft.com/office/drawing/2014/main" id="{D3B37C7C-21C8-424F-A409-9BF14D272E7D}"/>
-              </a:ext>
-            </a:extLst>
-          </p:cNvPr>
+          <p:cNvPr id="2" name="Title 1"/>
           <p:cNvSpPr>
             <a:spLocks noGrp="1"/>
           </p:cNvSpPr>
@@ -216,18 +306,13 @@
               <a:rPr lang="en-US"/>
               <a:t>Click to edit Master title style</a:t>
             </a:r>
-          </a:p>
-        </p:txBody>
-      </p:sp>
-      <p:sp>
-        <p:nvSpPr>
-          <p:cNvPr id="3" name="Subtitle 2">
-            <a:extLst>
-              <a:ext uri="{FF2B5EF4-FFF2-40B4-BE49-F238E27FC236}">
-                <a16:creationId xmlns:a16="http://schemas.microsoft.com/office/drawing/2014/main" id="{33FB4B25-ADDE-44B0-8A89-24A5133D6106}"/>
-              </a:ext>
-            </a:extLst>
-          </p:cNvPr>
+            <a:endParaRPr lang="en-US" dirty="0"/>
+          </a:p>
+        </p:txBody>
+      </p:sp>
+      <p:sp>
+        <p:nvSpPr>
+          <p:cNvPr id="3" name="Subtitle 2"/>
           <p:cNvSpPr>
             <a:spLocks noGrp="1"/>
           </p:cNvSpPr>
@@ -286,18 +371,13 @@
               <a:rPr lang="en-US"/>
               <a:t>Click to edit Master subtitle style</a:t>
             </a:r>
-          </a:p>
-        </p:txBody>
-      </p:sp>
-      <p:sp>
-        <p:nvSpPr>
-          <p:cNvPr id="4" name="Date Placeholder 3">
-            <a:extLst>
-              <a:ext uri="{FF2B5EF4-FFF2-40B4-BE49-F238E27FC236}">
-                <a16:creationId xmlns:a16="http://schemas.microsoft.com/office/drawing/2014/main" id="{CCAACEAD-BFB1-48AA-A495-C460A451EC43}"/>
-              </a:ext>
-            </a:extLst>
-          </p:cNvPr>
+            <a:endParaRPr lang="en-US" dirty="0"/>
+          </a:p>
+        </p:txBody>
+      </p:sp>
+      <p:sp>
+        <p:nvSpPr>
+          <p:cNvPr id="4" name="Date Placeholder 3"/>
           <p:cNvSpPr>
             <a:spLocks noGrp="1"/>
           </p:cNvSpPr>
@@ -312,7 +392,7 @@
           <a:p>
             <a:fld id="{A310A56D-2A73-4214-BDEC-EE3DDD3E3C39}" type="datetimeFigureOut">
               <a:rPr lang="en-US" smtClean="0"/>
-              <a:t>8/2/2020</a:t>
+              <a:t>8/6/2020</a:t>
             </a:fld>
             <a:endParaRPr lang="en-US"/>
           </a:p>
@@ -320,13 +400,7 @@
       </p:sp>
       <p:sp>
         <p:nvSpPr>
-          <p:cNvPr id="5" name="Footer Placeholder 4">
-            <a:extLst>
-              <a:ext uri="{FF2B5EF4-FFF2-40B4-BE49-F238E27FC236}">
-                <a16:creationId xmlns:a16="http://schemas.microsoft.com/office/drawing/2014/main" id="{789C9952-B76D-4F14-8C76-4171137598DE}"/>
-              </a:ext>
-            </a:extLst>
-          </p:cNvPr>
+          <p:cNvPr id="5" name="Footer Placeholder 4"/>
           <p:cNvSpPr>
             <a:spLocks noGrp="1"/>
           </p:cNvSpPr>
@@ -345,13 +419,7 @@
       </p:sp>
       <p:sp>
         <p:nvSpPr>
-          <p:cNvPr id="6" name="Slide Number Placeholder 5">
-            <a:extLst>
-              <a:ext uri="{FF2B5EF4-FFF2-40B4-BE49-F238E27FC236}">
-                <a16:creationId xmlns:a16="http://schemas.microsoft.com/office/drawing/2014/main" id="{F80B5F27-D73D-46D5-83CB-888C93A7C97D}"/>
-              </a:ext>
-            </a:extLst>
-          </p:cNvPr>
+          <p:cNvPr id="6" name="Slide Number Placeholder 5"/>
           <p:cNvSpPr>
             <a:spLocks noGrp="1"/>
           </p:cNvSpPr>
@@ -375,7 +443,7 @@
     </p:spTree>
     <p:extLst>
       <p:ext uri="{BB962C8B-B14F-4D97-AF65-F5344CB8AC3E}">
-        <p14:creationId xmlns:p14="http://schemas.microsoft.com/office/powerpoint/2010/main" val="1762089329"/>
+        <p14:creationId xmlns:p14="http://schemas.microsoft.com/office/powerpoint/2010/main" val="3604365851"/>
       </p:ext>
     </p:extLst>
   </p:cSld>
@@ -404,13 +472,7 @@
       </p:grpSpPr>
       <p:sp>
         <p:nvSpPr>
-          <p:cNvPr id="2" name="Title 1">
-            <a:extLst>
-              <a:ext uri="{FF2B5EF4-FFF2-40B4-BE49-F238E27FC236}">
-                <a16:creationId xmlns:a16="http://schemas.microsoft.com/office/drawing/2014/main" id="{FAB0E330-4807-44E7-A5A4-ED231C86DAE0}"/>
-              </a:ext>
-            </a:extLst>
-          </p:cNvPr>
+          <p:cNvPr id="2" name="Title 1"/>
           <p:cNvSpPr>
             <a:spLocks noGrp="1"/>
           </p:cNvSpPr>
@@ -427,18 +489,13 @@
               <a:rPr lang="en-US"/>
               <a:t>Click to edit Master title style</a:t>
             </a:r>
-          </a:p>
-        </p:txBody>
-      </p:sp>
-      <p:sp>
-        <p:nvSpPr>
-          <p:cNvPr id="3" name="Vertical Text Placeholder 2">
-            <a:extLst>
-              <a:ext uri="{FF2B5EF4-FFF2-40B4-BE49-F238E27FC236}">
-                <a16:creationId xmlns:a16="http://schemas.microsoft.com/office/drawing/2014/main" id="{E64DBCDC-EFC3-499F-B696-E830D8100EB1}"/>
-              </a:ext>
-            </a:extLst>
-          </p:cNvPr>
+            <a:endParaRPr lang="en-US" dirty="0"/>
+          </a:p>
+        </p:txBody>
+      </p:sp>
+      <p:sp>
+        <p:nvSpPr>
+          <p:cNvPr id="3" name="Vertical Text Placeholder 2"/>
           <p:cNvSpPr>
             <a:spLocks noGrp="1"/>
           </p:cNvSpPr>
@@ -484,18 +541,13 @@
               <a:rPr lang="en-US"/>
               <a:t>Fifth level</a:t>
             </a:r>
-          </a:p>
-        </p:txBody>
-      </p:sp>
-      <p:sp>
-        <p:nvSpPr>
-          <p:cNvPr id="4" name="Date Placeholder 3">
-            <a:extLst>
-              <a:ext uri="{FF2B5EF4-FFF2-40B4-BE49-F238E27FC236}">
-                <a16:creationId xmlns:a16="http://schemas.microsoft.com/office/drawing/2014/main" id="{E75CC6F7-C88E-42AF-BC49-B7C4DFF381BF}"/>
-              </a:ext>
-            </a:extLst>
-          </p:cNvPr>
+            <a:endParaRPr lang="en-US" dirty="0"/>
+          </a:p>
+        </p:txBody>
+      </p:sp>
+      <p:sp>
+        <p:nvSpPr>
+          <p:cNvPr id="4" name="Date Placeholder 3"/>
           <p:cNvSpPr>
             <a:spLocks noGrp="1"/>
           </p:cNvSpPr>
@@ -510,7 +562,7 @@
           <a:p>
             <a:fld id="{A310A56D-2A73-4214-BDEC-EE3DDD3E3C39}" type="datetimeFigureOut">
               <a:rPr lang="en-US" smtClean="0"/>
-              <a:t>8/2/2020</a:t>
+              <a:t>8/6/2020</a:t>
             </a:fld>
             <a:endParaRPr lang="en-US"/>
           </a:p>
@@ -518,13 +570,7 @@
       </p:sp>
       <p:sp>
         <p:nvSpPr>
-          <p:cNvPr id="5" name="Footer Placeholder 4">
-            <a:extLst>
-              <a:ext uri="{FF2B5EF4-FFF2-40B4-BE49-F238E27FC236}">
-                <a16:creationId xmlns:a16="http://schemas.microsoft.com/office/drawing/2014/main" id="{0B3D4AF2-856A-4B4C-B4AE-AB7E4C122341}"/>
-              </a:ext>
-            </a:extLst>
-          </p:cNvPr>
+          <p:cNvPr id="5" name="Footer Placeholder 4"/>
           <p:cNvSpPr>
             <a:spLocks noGrp="1"/>
           </p:cNvSpPr>
@@ -543,13 +589,7 @@
       </p:sp>
       <p:sp>
         <p:nvSpPr>
-          <p:cNvPr id="6" name="Slide Number Placeholder 5">
-            <a:extLst>
-              <a:ext uri="{FF2B5EF4-FFF2-40B4-BE49-F238E27FC236}">
-                <a16:creationId xmlns:a16="http://schemas.microsoft.com/office/drawing/2014/main" id="{DC3FA94F-145C-48A4-935F-0912EDC2E1BF}"/>
-              </a:ext>
-            </a:extLst>
-          </p:cNvPr>
+          <p:cNvPr id="6" name="Slide Number Placeholder 5"/>
           <p:cNvSpPr>
             <a:spLocks noGrp="1"/>
           </p:cNvSpPr>
@@ -573,7 +613,7 @@
     </p:spTree>
     <p:extLst>
       <p:ext uri="{BB962C8B-B14F-4D97-AF65-F5344CB8AC3E}">
-        <p14:creationId xmlns:p14="http://schemas.microsoft.com/office/powerpoint/2010/main" val="1081717538"/>
+        <p14:creationId xmlns:p14="http://schemas.microsoft.com/office/powerpoint/2010/main" val="522256396"/>
       </p:ext>
     </p:extLst>
   </p:cSld>
@@ -602,13 +642,7 @@
       </p:grpSpPr>
       <p:sp>
         <p:nvSpPr>
-          <p:cNvPr id="2" name="Vertical Title 1">
-            <a:extLst>
-              <a:ext uri="{FF2B5EF4-FFF2-40B4-BE49-F238E27FC236}">
-                <a16:creationId xmlns:a16="http://schemas.microsoft.com/office/drawing/2014/main" id="{2E7B879D-9AE0-490D-A91B-FC4D171688D1}"/>
-              </a:ext>
-            </a:extLst>
-          </p:cNvPr>
+          <p:cNvPr id="2" name="Vertical Title 1"/>
           <p:cNvSpPr>
             <a:spLocks noGrp="1"/>
           </p:cNvSpPr>
@@ -630,18 +664,13 @@
               <a:rPr lang="en-US"/>
               <a:t>Click to edit Master title style</a:t>
             </a:r>
-          </a:p>
-        </p:txBody>
-      </p:sp>
-      <p:sp>
-        <p:nvSpPr>
-          <p:cNvPr id="3" name="Vertical Text Placeholder 2">
-            <a:extLst>
-              <a:ext uri="{FF2B5EF4-FFF2-40B4-BE49-F238E27FC236}">
-                <a16:creationId xmlns:a16="http://schemas.microsoft.com/office/drawing/2014/main" id="{961FC221-28B0-48FB-B0FE-1D993FC9D44E}"/>
-              </a:ext>
-            </a:extLst>
-          </p:cNvPr>
+            <a:endParaRPr lang="en-US" dirty="0"/>
+          </a:p>
+        </p:txBody>
+      </p:sp>
+      <p:sp>
+        <p:nvSpPr>
+          <p:cNvPr id="3" name="Vertical Text Placeholder 2"/>
           <p:cNvSpPr>
             <a:spLocks noGrp="1"/>
           </p:cNvSpPr>
@@ -692,18 +721,13 @@
               <a:rPr lang="en-US"/>
               <a:t>Fifth level</a:t>
             </a:r>
-          </a:p>
-        </p:txBody>
-      </p:sp>
-      <p:sp>
-        <p:nvSpPr>
-          <p:cNvPr id="4" name="Date Placeholder 3">
-            <a:extLst>
-              <a:ext uri="{FF2B5EF4-FFF2-40B4-BE49-F238E27FC236}">
-                <a16:creationId xmlns:a16="http://schemas.microsoft.com/office/drawing/2014/main" id="{FF6987BC-0294-4FD6-80B5-127ADD2F6FAD}"/>
-              </a:ext>
-            </a:extLst>
-          </p:cNvPr>
+            <a:endParaRPr lang="en-US" dirty="0"/>
+          </a:p>
+        </p:txBody>
+      </p:sp>
+      <p:sp>
+        <p:nvSpPr>
+          <p:cNvPr id="4" name="Date Placeholder 3"/>
           <p:cNvSpPr>
             <a:spLocks noGrp="1"/>
           </p:cNvSpPr>
@@ -718,7 +742,7 @@
           <a:p>
             <a:fld id="{A310A56D-2A73-4214-BDEC-EE3DDD3E3C39}" type="datetimeFigureOut">
               <a:rPr lang="en-US" smtClean="0"/>
-              <a:t>8/2/2020</a:t>
+              <a:t>8/6/2020</a:t>
             </a:fld>
             <a:endParaRPr lang="en-US"/>
           </a:p>
@@ -726,13 +750,7 @@
       </p:sp>
       <p:sp>
         <p:nvSpPr>
-          <p:cNvPr id="5" name="Footer Placeholder 4">
-            <a:extLst>
-              <a:ext uri="{FF2B5EF4-FFF2-40B4-BE49-F238E27FC236}">
-                <a16:creationId xmlns:a16="http://schemas.microsoft.com/office/drawing/2014/main" id="{7BA844CC-E19C-4024-89C0-B859DCC699AF}"/>
-              </a:ext>
-            </a:extLst>
-          </p:cNvPr>
+          <p:cNvPr id="5" name="Footer Placeholder 4"/>
           <p:cNvSpPr>
             <a:spLocks noGrp="1"/>
           </p:cNvSpPr>
@@ -751,13 +769,7 @@
       </p:sp>
       <p:sp>
         <p:nvSpPr>
-          <p:cNvPr id="6" name="Slide Number Placeholder 5">
-            <a:extLst>
-              <a:ext uri="{FF2B5EF4-FFF2-40B4-BE49-F238E27FC236}">
-                <a16:creationId xmlns:a16="http://schemas.microsoft.com/office/drawing/2014/main" id="{DE12438E-6655-43F2-BCBA-975EA65A8103}"/>
-              </a:ext>
-            </a:extLst>
-          </p:cNvPr>
+          <p:cNvPr id="6" name="Slide Number Placeholder 5"/>
           <p:cNvSpPr>
             <a:spLocks noGrp="1"/>
           </p:cNvSpPr>
@@ -781,7 +793,7 @@
     </p:spTree>
     <p:extLst>
       <p:ext uri="{BB962C8B-B14F-4D97-AF65-F5344CB8AC3E}">
-        <p14:creationId xmlns:p14="http://schemas.microsoft.com/office/powerpoint/2010/main" val="2023715101"/>
+        <p14:creationId xmlns:p14="http://schemas.microsoft.com/office/powerpoint/2010/main" val="3445887728"/>
       </p:ext>
     </p:extLst>
   </p:cSld>
@@ -810,13 +822,7 @@
       </p:grpSpPr>
       <p:sp>
         <p:nvSpPr>
-          <p:cNvPr id="2" name="Title 1">
-            <a:extLst>
-              <a:ext uri="{FF2B5EF4-FFF2-40B4-BE49-F238E27FC236}">
-                <a16:creationId xmlns:a16="http://schemas.microsoft.com/office/drawing/2014/main" id="{8AC89E9B-A33D-46FF-B48D-C4DD1C2D6567}"/>
-              </a:ext>
-            </a:extLst>
-          </p:cNvPr>
+          <p:cNvPr id="2" name="Title 1"/>
           <p:cNvSpPr>
             <a:spLocks noGrp="1"/>
           </p:cNvSpPr>
@@ -833,18 +839,13 @@
               <a:rPr lang="en-US"/>
               <a:t>Click to edit Master title style</a:t>
             </a:r>
-          </a:p>
-        </p:txBody>
-      </p:sp>
-      <p:sp>
-        <p:nvSpPr>
-          <p:cNvPr id="3" name="Content Placeholder 2">
-            <a:extLst>
-              <a:ext uri="{FF2B5EF4-FFF2-40B4-BE49-F238E27FC236}">
-                <a16:creationId xmlns:a16="http://schemas.microsoft.com/office/drawing/2014/main" id="{005191A7-EC03-43A1-AE22-0B3CC9501E51}"/>
-              </a:ext>
-            </a:extLst>
-          </p:cNvPr>
+            <a:endParaRPr lang="en-US" dirty="0"/>
+          </a:p>
+        </p:txBody>
+      </p:sp>
+      <p:sp>
+        <p:nvSpPr>
+          <p:cNvPr id="3" name="Content Placeholder 2"/>
           <p:cNvSpPr>
             <a:spLocks noGrp="1"/>
           </p:cNvSpPr>
@@ -890,18 +891,13 @@
               <a:rPr lang="en-US"/>
               <a:t>Fifth level</a:t>
             </a:r>
-          </a:p>
-        </p:txBody>
-      </p:sp>
-      <p:sp>
-        <p:nvSpPr>
-          <p:cNvPr id="4" name="Date Placeholder 3">
-            <a:extLst>
-              <a:ext uri="{FF2B5EF4-FFF2-40B4-BE49-F238E27FC236}">
-                <a16:creationId xmlns:a16="http://schemas.microsoft.com/office/drawing/2014/main" id="{C0C4DB94-C8C3-4CB5-963C-90DC8CC72B90}"/>
-              </a:ext>
-            </a:extLst>
-          </p:cNvPr>
+            <a:endParaRPr lang="en-US" dirty="0"/>
+          </a:p>
+        </p:txBody>
+      </p:sp>
+      <p:sp>
+        <p:nvSpPr>
+          <p:cNvPr id="4" name="Date Placeholder 3"/>
           <p:cNvSpPr>
             <a:spLocks noGrp="1"/>
           </p:cNvSpPr>
@@ -916,7 +912,7 @@
           <a:p>
             <a:fld id="{A310A56D-2A73-4214-BDEC-EE3DDD3E3C39}" type="datetimeFigureOut">
               <a:rPr lang="en-US" smtClean="0"/>
-              <a:t>8/2/2020</a:t>
+              <a:t>8/6/2020</a:t>
             </a:fld>
             <a:endParaRPr lang="en-US"/>
           </a:p>
@@ -924,13 +920,7 @@
       </p:sp>
       <p:sp>
         <p:nvSpPr>
-          <p:cNvPr id="5" name="Footer Placeholder 4">
-            <a:extLst>
-              <a:ext uri="{FF2B5EF4-FFF2-40B4-BE49-F238E27FC236}">
-                <a16:creationId xmlns:a16="http://schemas.microsoft.com/office/drawing/2014/main" id="{0547A8C1-D7F5-4B0A-82C7-5D39EDAE1476}"/>
-              </a:ext>
-            </a:extLst>
-          </p:cNvPr>
+          <p:cNvPr id="5" name="Footer Placeholder 4"/>
           <p:cNvSpPr>
             <a:spLocks noGrp="1"/>
           </p:cNvSpPr>
@@ -949,13 +939,7 @@
       </p:sp>
       <p:sp>
         <p:nvSpPr>
-          <p:cNvPr id="6" name="Slide Number Placeholder 5">
-            <a:extLst>
-              <a:ext uri="{FF2B5EF4-FFF2-40B4-BE49-F238E27FC236}">
-                <a16:creationId xmlns:a16="http://schemas.microsoft.com/office/drawing/2014/main" id="{4B75185E-369B-4275-814A-F31F6DE79010}"/>
-              </a:ext>
-            </a:extLst>
-          </p:cNvPr>
+          <p:cNvPr id="6" name="Slide Number Placeholder 5"/>
           <p:cNvSpPr>
             <a:spLocks noGrp="1"/>
           </p:cNvSpPr>
@@ -979,7 +963,7 @@
     </p:spTree>
     <p:extLst>
       <p:ext uri="{BB962C8B-B14F-4D97-AF65-F5344CB8AC3E}">
-        <p14:creationId xmlns:p14="http://schemas.microsoft.com/office/powerpoint/2010/main" val="1534629150"/>
+        <p14:creationId xmlns:p14="http://schemas.microsoft.com/office/powerpoint/2010/main" val="3942564165"/>
       </p:ext>
     </p:extLst>
   </p:cSld>
@@ -1008,13 +992,7 @@
       </p:grpSpPr>
       <p:sp>
         <p:nvSpPr>
-          <p:cNvPr id="2" name="Title 1">
-            <a:extLst>
-              <a:ext uri="{FF2B5EF4-FFF2-40B4-BE49-F238E27FC236}">
-                <a16:creationId xmlns:a16="http://schemas.microsoft.com/office/drawing/2014/main" id="{705514FE-D1E6-4BA8-8D91-4405ACA6836C}"/>
-              </a:ext>
-            </a:extLst>
-          </p:cNvPr>
+          <p:cNvPr id="2" name="Title 1"/>
           <p:cNvSpPr>
             <a:spLocks noGrp="1"/>
           </p:cNvSpPr>
@@ -1040,18 +1018,13 @@
               <a:rPr lang="en-US"/>
               <a:t>Click to edit Master title style</a:t>
             </a:r>
-          </a:p>
-        </p:txBody>
-      </p:sp>
-      <p:sp>
-        <p:nvSpPr>
-          <p:cNvPr id="3" name="Text Placeholder 2">
-            <a:extLst>
-              <a:ext uri="{FF2B5EF4-FFF2-40B4-BE49-F238E27FC236}">
-                <a16:creationId xmlns:a16="http://schemas.microsoft.com/office/drawing/2014/main" id="{EA1BCADD-6FCC-4F2E-A860-56F71ED6C969}"/>
-              </a:ext>
-            </a:extLst>
-          </p:cNvPr>
+            <a:endParaRPr lang="en-US" dirty="0"/>
+          </a:p>
+        </p:txBody>
+      </p:sp>
+      <p:sp>
+        <p:nvSpPr>
+          <p:cNvPr id="3" name="Text Placeholder 2"/>
           <p:cNvSpPr>
             <a:spLocks noGrp="1"/>
           </p:cNvSpPr>
@@ -1170,13 +1143,7 @@
       </p:sp>
       <p:sp>
         <p:nvSpPr>
-          <p:cNvPr id="4" name="Date Placeholder 3">
-            <a:extLst>
-              <a:ext uri="{FF2B5EF4-FFF2-40B4-BE49-F238E27FC236}">
-                <a16:creationId xmlns:a16="http://schemas.microsoft.com/office/drawing/2014/main" id="{59AD5121-8836-4169-9C20-DDF09928D3BB}"/>
-              </a:ext>
-            </a:extLst>
-          </p:cNvPr>
+          <p:cNvPr id="4" name="Date Placeholder 3"/>
           <p:cNvSpPr>
             <a:spLocks noGrp="1"/>
           </p:cNvSpPr>
@@ -1191,7 +1158,7 @@
           <a:p>
             <a:fld id="{A310A56D-2A73-4214-BDEC-EE3DDD3E3C39}" type="datetimeFigureOut">
               <a:rPr lang="en-US" smtClean="0"/>
-              <a:t>8/2/2020</a:t>
+              <a:t>8/6/2020</a:t>
             </a:fld>
             <a:endParaRPr lang="en-US"/>
           </a:p>
@@ -1199,13 +1166,7 @@
       </p:sp>
       <p:sp>
         <p:nvSpPr>
-          <p:cNvPr id="5" name="Footer Placeholder 4">
-            <a:extLst>
-              <a:ext uri="{FF2B5EF4-FFF2-40B4-BE49-F238E27FC236}">
-                <a16:creationId xmlns:a16="http://schemas.microsoft.com/office/drawing/2014/main" id="{078E6D33-636F-49A5-A5E8-29CF43ED5D70}"/>
-              </a:ext>
-            </a:extLst>
-          </p:cNvPr>
+          <p:cNvPr id="5" name="Footer Placeholder 4"/>
           <p:cNvSpPr>
             <a:spLocks noGrp="1"/>
           </p:cNvSpPr>
@@ -1224,13 +1185,7 @@
       </p:sp>
       <p:sp>
         <p:nvSpPr>
-          <p:cNvPr id="6" name="Slide Number Placeholder 5">
-            <a:extLst>
-              <a:ext uri="{FF2B5EF4-FFF2-40B4-BE49-F238E27FC236}">
-                <a16:creationId xmlns:a16="http://schemas.microsoft.com/office/drawing/2014/main" id="{EA1194DE-BA57-4475-83F8-A1C9917B4696}"/>
-              </a:ext>
-            </a:extLst>
-          </p:cNvPr>
+          <p:cNvPr id="6" name="Slide Number Placeholder 5"/>
           <p:cNvSpPr>
             <a:spLocks noGrp="1"/>
           </p:cNvSpPr>
@@ -1254,7 +1209,7 @@
     </p:spTree>
     <p:extLst>
       <p:ext uri="{BB962C8B-B14F-4D97-AF65-F5344CB8AC3E}">
-        <p14:creationId xmlns:p14="http://schemas.microsoft.com/office/powerpoint/2010/main" val="284111324"/>
+        <p14:creationId xmlns:p14="http://schemas.microsoft.com/office/powerpoint/2010/main" val="1712169665"/>
       </p:ext>
     </p:extLst>
   </p:cSld>
@@ -1283,13 +1238,7 @@
       </p:grpSpPr>
       <p:sp>
         <p:nvSpPr>
-          <p:cNvPr id="2" name="Title 1">
-            <a:extLst>
-              <a:ext uri="{FF2B5EF4-FFF2-40B4-BE49-F238E27FC236}">
-                <a16:creationId xmlns:a16="http://schemas.microsoft.com/office/drawing/2014/main" id="{747FD54F-BE32-4983-9FDB-1E3DBDB574D5}"/>
-              </a:ext>
-            </a:extLst>
-          </p:cNvPr>
+          <p:cNvPr id="2" name="Title 1"/>
           <p:cNvSpPr>
             <a:spLocks noGrp="1"/>
           </p:cNvSpPr>
@@ -1306,18 +1255,13 @@
               <a:rPr lang="en-US"/>
               <a:t>Click to edit Master title style</a:t>
             </a:r>
-          </a:p>
-        </p:txBody>
-      </p:sp>
-      <p:sp>
-        <p:nvSpPr>
-          <p:cNvPr id="3" name="Content Placeholder 2">
-            <a:extLst>
-              <a:ext uri="{FF2B5EF4-FFF2-40B4-BE49-F238E27FC236}">
-                <a16:creationId xmlns:a16="http://schemas.microsoft.com/office/drawing/2014/main" id="{F50C1389-8A01-4582-A635-F64FF8CF4573}"/>
-              </a:ext>
-            </a:extLst>
-          </p:cNvPr>
+            <a:endParaRPr lang="en-US" dirty="0"/>
+          </a:p>
+        </p:txBody>
+      </p:sp>
+      <p:sp>
+        <p:nvSpPr>
+          <p:cNvPr id="3" name="Content Placeholder 2"/>
           <p:cNvSpPr>
             <a:spLocks noGrp="1"/>
           </p:cNvSpPr>
@@ -1368,18 +1312,13 @@
               <a:rPr lang="en-US"/>
               <a:t>Fifth level</a:t>
             </a:r>
-          </a:p>
-        </p:txBody>
-      </p:sp>
-      <p:sp>
-        <p:nvSpPr>
-          <p:cNvPr id="4" name="Content Placeholder 3">
-            <a:extLst>
-              <a:ext uri="{FF2B5EF4-FFF2-40B4-BE49-F238E27FC236}">
-                <a16:creationId xmlns:a16="http://schemas.microsoft.com/office/drawing/2014/main" id="{ECC2B960-9FB6-4673-A619-D70A58B6D10C}"/>
-              </a:ext>
-            </a:extLst>
-          </p:cNvPr>
+            <a:endParaRPr lang="en-US" dirty="0"/>
+          </a:p>
+        </p:txBody>
+      </p:sp>
+      <p:sp>
+        <p:nvSpPr>
+          <p:cNvPr id="4" name="Content Placeholder 3"/>
           <p:cNvSpPr>
             <a:spLocks noGrp="1"/>
           </p:cNvSpPr>
@@ -1430,18 +1369,13 @@
               <a:rPr lang="en-US"/>
               <a:t>Fifth level</a:t>
             </a:r>
-          </a:p>
-        </p:txBody>
-      </p:sp>
-      <p:sp>
-        <p:nvSpPr>
-          <p:cNvPr id="5" name="Date Placeholder 4">
-            <a:extLst>
-              <a:ext uri="{FF2B5EF4-FFF2-40B4-BE49-F238E27FC236}">
-                <a16:creationId xmlns:a16="http://schemas.microsoft.com/office/drawing/2014/main" id="{C4004656-0434-4D21-AE82-8B335ABF9FB7}"/>
-              </a:ext>
-            </a:extLst>
-          </p:cNvPr>
+            <a:endParaRPr lang="en-US" dirty="0"/>
+          </a:p>
+        </p:txBody>
+      </p:sp>
+      <p:sp>
+        <p:nvSpPr>
+          <p:cNvPr id="5" name="Date Placeholder 4"/>
           <p:cNvSpPr>
             <a:spLocks noGrp="1"/>
           </p:cNvSpPr>
@@ -1456,7 +1390,7 @@
           <a:p>
             <a:fld id="{A310A56D-2A73-4214-BDEC-EE3DDD3E3C39}" type="datetimeFigureOut">
               <a:rPr lang="en-US" smtClean="0"/>
-              <a:t>8/2/2020</a:t>
+              <a:t>8/6/2020</a:t>
             </a:fld>
             <a:endParaRPr lang="en-US"/>
           </a:p>
@@ -1464,13 +1398,7 @@
       </p:sp>
       <p:sp>
         <p:nvSpPr>
-          <p:cNvPr id="6" name="Footer Placeholder 5">
-            <a:extLst>
-              <a:ext uri="{FF2B5EF4-FFF2-40B4-BE49-F238E27FC236}">
-                <a16:creationId xmlns:a16="http://schemas.microsoft.com/office/drawing/2014/main" id="{9758127D-DFC0-46D4-BE3A-CDF86AF4E1CC}"/>
-              </a:ext>
-            </a:extLst>
-          </p:cNvPr>
+          <p:cNvPr id="6" name="Footer Placeholder 5"/>
           <p:cNvSpPr>
             <a:spLocks noGrp="1"/>
           </p:cNvSpPr>
@@ -1489,13 +1417,7 @@
       </p:sp>
       <p:sp>
         <p:nvSpPr>
-          <p:cNvPr id="7" name="Slide Number Placeholder 6">
-            <a:extLst>
-              <a:ext uri="{FF2B5EF4-FFF2-40B4-BE49-F238E27FC236}">
-                <a16:creationId xmlns:a16="http://schemas.microsoft.com/office/drawing/2014/main" id="{B4C57A4C-12CC-4F1E-A0B4-A43036E198DC}"/>
-              </a:ext>
-            </a:extLst>
-          </p:cNvPr>
+          <p:cNvPr id="7" name="Slide Number Placeholder 6"/>
           <p:cNvSpPr>
             <a:spLocks noGrp="1"/>
           </p:cNvSpPr>
@@ -1519,7 +1441,7 @@
     </p:spTree>
     <p:extLst>
       <p:ext uri="{BB962C8B-B14F-4D97-AF65-F5344CB8AC3E}">
-        <p14:creationId xmlns:p14="http://schemas.microsoft.com/office/powerpoint/2010/main" val="1680896701"/>
+        <p14:creationId xmlns:p14="http://schemas.microsoft.com/office/powerpoint/2010/main" val="362261546"/>
       </p:ext>
     </p:extLst>
   </p:cSld>
@@ -1548,13 +1470,7 @@
       </p:grpSpPr>
       <p:sp>
         <p:nvSpPr>
-          <p:cNvPr id="2" name="Title 1">
-            <a:extLst>
-              <a:ext uri="{FF2B5EF4-FFF2-40B4-BE49-F238E27FC236}">
-                <a16:creationId xmlns:a16="http://schemas.microsoft.com/office/drawing/2014/main" id="{9335E234-A207-468F-83BF-EEFD76967CA6}"/>
-              </a:ext>
-            </a:extLst>
-          </p:cNvPr>
+          <p:cNvPr id="2" name="Title 1"/>
           <p:cNvSpPr>
             <a:spLocks noGrp="1"/>
           </p:cNvSpPr>
@@ -1576,18 +1492,13 @@
               <a:rPr lang="en-US"/>
               <a:t>Click to edit Master title style</a:t>
             </a:r>
-          </a:p>
-        </p:txBody>
-      </p:sp>
-      <p:sp>
-        <p:nvSpPr>
-          <p:cNvPr id="3" name="Text Placeholder 2">
-            <a:extLst>
-              <a:ext uri="{FF2B5EF4-FFF2-40B4-BE49-F238E27FC236}">
-                <a16:creationId xmlns:a16="http://schemas.microsoft.com/office/drawing/2014/main" id="{32E8E311-7A48-4C90-9E08-27870F711D0C}"/>
-              </a:ext>
-            </a:extLst>
-          </p:cNvPr>
+            <a:endParaRPr lang="en-US" dirty="0"/>
+          </a:p>
+        </p:txBody>
+      </p:sp>
+      <p:sp>
+        <p:nvSpPr>
+          <p:cNvPr id="3" name="Text Placeholder 2"/>
           <p:cNvSpPr>
             <a:spLocks noGrp="1"/>
           </p:cNvSpPr>
@@ -1652,13 +1563,7 @@
       </p:sp>
       <p:sp>
         <p:nvSpPr>
-          <p:cNvPr id="4" name="Content Placeholder 3">
-            <a:extLst>
-              <a:ext uri="{FF2B5EF4-FFF2-40B4-BE49-F238E27FC236}">
-                <a16:creationId xmlns:a16="http://schemas.microsoft.com/office/drawing/2014/main" id="{1374C382-CA87-456A-BEB1-280CC9514A54}"/>
-              </a:ext>
-            </a:extLst>
-          </p:cNvPr>
+          <p:cNvPr id="4" name="Content Placeholder 3"/>
           <p:cNvSpPr>
             <a:spLocks noGrp="1"/>
           </p:cNvSpPr>
@@ -1709,18 +1614,13 @@
               <a:rPr lang="en-US"/>
               <a:t>Fifth level</a:t>
             </a:r>
-          </a:p>
-        </p:txBody>
-      </p:sp>
-      <p:sp>
-        <p:nvSpPr>
-          <p:cNvPr id="5" name="Text Placeholder 4">
-            <a:extLst>
-              <a:ext uri="{FF2B5EF4-FFF2-40B4-BE49-F238E27FC236}">
-                <a16:creationId xmlns:a16="http://schemas.microsoft.com/office/drawing/2014/main" id="{FE398C69-70BF-4209-BC56-00A0E3CAB341}"/>
-              </a:ext>
-            </a:extLst>
-          </p:cNvPr>
+            <a:endParaRPr lang="en-US" dirty="0"/>
+          </a:p>
+        </p:txBody>
+      </p:sp>
+      <p:sp>
+        <p:nvSpPr>
+          <p:cNvPr id="5" name="Text Placeholder 4"/>
           <p:cNvSpPr>
             <a:spLocks noGrp="1"/>
           </p:cNvSpPr>
@@ -1785,13 +1685,7 @@
       </p:sp>
       <p:sp>
         <p:nvSpPr>
-          <p:cNvPr id="6" name="Content Placeholder 5">
-            <a:extLst>
-              <a:ext uri="{FF2B5EF4-FFF2-40B4-BE49-F238E27FC236}">
-                <a16:creationId xmlns:a16="http://schemas.microsoft.com/office/drawing/2014/main" id="{4D4D9AA5-4A2C-4518-A7CC-C6AA3C09BF67}"/>
-              </a:ext>
-            </a:extLst>
-          </p:cNvPr>
+          <p:cNvPr id="6" name="Content Placeholder 5"/>
           <p:cNvSpPr>
             <a:spLocks noGrp="1"/>
           </p:cNvSpPr>
@@ -1842,18 +1736,13 @@
               <a:rPr lang="en-US"/>
               <a:t>Fifth level</a:t>
             </a:r>
-          </a:p>
-        </p:txBody>
-      </p:sp>
-      <p:sp>
-        <p:nvSpPr>
-          <p:cNvPr id="7" name="Date Placeholder 6">
-            <a:extLst>
-              <a:ext uri="{FF2B5EF4-FFF2-40B4-BE49-F238E27FC236}">
-                <a16:creationId xmlns:a16="http://schemas.microsoft.com/office/drawing/2014/main" id="{1C8C8CA4-7599-4CCA-8BCE-0C2F698B8A6D}"/>
-              </a:ext>
-            </a:extLst>
-          </p:cNvPr>
+            <a:endParaRPr lang="en-US" dirty="0"/>
+          </a:p>
+        </p:txBody>
+      </p:sp>
+      <p:sp>
+        <p:nvSpPr>
+          <p:cNvPr id="7" name="Date Placeholder 6"/>
           <p:cNvSpPr>
             <a:spLocks noGrp="1"/>
           </p:cNvSpPr>
@@ -1868,7 +1757,7 @@
           <a:p>
             <a:fld id="{A310A56D-2A73-4214-BDEC-EE3DDD3E3C39}" type="datetimeFigureOut">
               <a:rPr lang="en-US" smtClean="0"/>
-              <a:t>8/2/2020</a:t>
+              <a:t>8/6/2020</a:t>
             </a:fld>
             <a:endParaRPr lang="en-US"/>
           </a:p>
@@ -1876,13 +1765,7 @@
       </p:sp>
       <p:sp>
         <p:nvSpPr>
-          <p:cNvPr id="8" name="Footer Placeholder 7">
-            <a:extLst>
-              <a:ext uri="{FF2B5EF4-FFF2-40B4-BE49-F238E27FC236}">
-                <a16:creationId xmlns:a16="http://schemas.microsoft.com/office/drawing/2014/main" id="{F67F7164-8D76-49A5-9B8E-C28C24E2E818}"/>
-              </a:ext>
-            </a:extLst>
-          </p:cNvPr>
+          <p:cNvPr id="8" name="Footer Placeholder 7"/>
           <p:cNvSpPr>
             <a:spLocks noGrp="1"/>
           </p:cNvSpPr>
@@ -1901,13 +1784,7 @@
       </p:sp>
       <p:sp>
         <p:nvSpPr>
-          <p:cNvPr id="9" name="Slide Number Placeholder 8">
-            <a:extLst>
-              <a:ext uri="{FF2B5EF4-FFF2-40B4-BE49-F238E27FC236}">
-                <a16:creationId xmlns:a16="http://schemas.microsoft.com/office/drawing/2014/main" id="{E26F397E-285E-4B54-BD56-4E907AFDA37B}"/>
-              </a:ext>
-            </a:extLst>
-          </p:cNvPr>
+          <p:cNvPr id="9" name="Slide Number Placeholder 8"/>
           <p:cNvSpPr>
             <a:spLocks noGrp="1"/>
           </p:cNvSpPr>
@@ -1931,7 +1808,7 @@
     </p:spTree>
     <p:extLst>
       <p:ext uri="{BB962C8B-B14F-4D97-AF65-F5344CB8AC3E}">
-        <p14:creationId xmlns:p14="http://schemas.microsoft.com/office/powerpoint/2010/main" val="4143893424"/>
+        <p14:creationId xmlns:p14="http://schemas.microsoft.com/office/powerpoint/2010/main" val="3043350692"/>
       </p:ext>
     </p:extLst>
   </p:cSld>
@@ -1960,13 +1837,7 @@
       </p:grpSpPr>
       <p:sp>
         <p:nvSpPr>
-          <p:cNvPr id="2" name="Title 1">
-            <a:extLst>
-              <a:ext uri="{FF2B5EF4-FFF2-40B4-BE49-F238E27FC236}">
-                <a16:creationId xmlns:a16="http://schemas.microsoft.com/office/drawing/2014/main" id="{9D8B6A94-76D8-47C6-AF66-A417911ADAC1}"/>
-              </a:ext>
-            </a:extLst>
-          </p:cNvPr>
+          <p:cNvPr id="2" name="Title 1"/>
           <p:cNvSpPr>
             <a:spLocks noGrp="1"/>
           </p:cNvSpPr>
@@ -1983,18 +1854,13 @@
               <a:rPr lang="en-US"/>
               <a:t>Click to edit Master title style</a:t>
             </a:r>
-          </a:p>
-        </p:txBody>
-      </p:sp>
-      <p:sp>
-        <p:nvSpPr>
-          <p:cNvPr id="3" name="Date Placeholder 2">
-            <a:extLst>
-              <a:ext uri="{FF2B5EF4-FFF2-40B4-BE49-F238E27FC236}">
-                <a16:creationId xmlns:a16="http://schemas.microsoft.com/office/drawing/2014/main" id="{097F81AE-6240-4128-A742-39DF5F1CA286}"/>
-              </a:ext>
-            </a:extLst>
-          </p:cNvPr>
+            <a:endParaRPr lang="en-US" dirty="0"/>
+          </a:p>
+        </p:txBody>
+      </p:sp>
+      <p:sp>
+        <p:nvSpPr>
+          <p:cNvPr id="3" name="Date Placeholder 2"/>
           <p:cNvSpPr>
             <a:spLocks noGrp="1"/>
           </p:cNvSpPr>
@@ -2009,7 +1875,7 @@
           <a:p>
             <a:fld id="{A310A56D-2A73-4214-BDEC-EE3DDD3E3C39}" type="datetimeFigureOut">
               <a:rPr lang="en-US" smtClean="0"/>
-              <a:t>8/2/2020</a:t>
+              <a:t>8/6/2020</a:t>
             </a:fld>
             <a:endParaRPr lang="en-US"/>
           </a:p>
@@ -2017,13 +1883,7 @@
       </p:sp>
       <p:sp>
         <p:nvSpPr>
-          <p:cNvPr id="4" name="Footer Placeholder 3">
-            <a:extLst>
-              <a:ext uri="{FF2B5EF4-FFF2-40B4-BE49-F238E27FC236}">
-                <a16:creationId xmlns:a16="http://schemas.microsoft.com/office/drawing/2014/main" id="{01C2C74A-68B2-48B5-B4F8-F9F4B00E6016}"/>
-              </a:ext>
-            </a:extLst>
-          </p:cNvPr>
+          <p:cNvPr id="4" name="Footer Placeholder 3"/>
           <p:cNvSpPr>
             <a:spLocks noGrp="1"/>
           </p:cNvSpPr>
@@ -2042,13 +1902,7 @@
       </p:sp>
       <p:sp>
         <p:nvSpPr>
-          <p:cNvPr id="5" name="Slide Number Placeholder 4">
-            <a:extLst>
-              <a:ext uri="{FF2B5EF4-FFF2-40B4-BE49-F238E27FC236}">
-                <a16:creationId xmlns:a16="http://schemas.microsoft.com/office/drawing/2014/main" id="{79789F8A-3F54-4E88-B574-C1E1F98F06D9}"/>
-              </a:ext>
-            </a:extLst>
-          </p:cNvPr>
+          <p:cNvPr id="5" name="Slide Number Placeholder 4"/>
           <p:cNvSpPr>
             <a:spLocks noGrp="1"/>
           </p:cNvSpPr>
@@ -2072,7 +1926,7 @@
     </p:spTree>
     <p:extLst>
       <p:ext uri="{BB962C8B-B14F-4D97-AF65-F5344CB8AC3E}">
-        <p14:creationId xmlns:p14="http://schemas.microsoft.com/office/powerpoint/2010/main" val="3582107582"/>
+        <p14:creationId xmlns:p14="http://schemas.microsoft.com/office/powerpoint/2010/main" val="2687901936"/>
       </p:ext>
     </p:extLst>
   </p:cSld>
@@ -2101,13 +1955,7 @@
       </p:grpSpPr>
       <p:sp>
         <p:nvSpPr>
-          <p:cNvPr id="2" name="Date Placeholder 1">
-            <a:extLst>
-              <a:ext uri="{FF2B5EF4-FFF2-40B4-BE49-F238E27FC236}">
-                <a16:creationId xmlns:a16="http://schemas.microsoft.com/office/drawing/2014/main" id="{4873BDF5-7E92-4E55-9DCC-167BF02F0D92}"/>
-              </a:ext>
-            </a:extLst>
-          </p:cNvPr>
+          <p:cNvPr id="2" name="Date Placeholder 1"/>
           <p:cNvSpPr>
             <a:spLocks noGrp="1"/>
           </p:cNvSpPr>
@@ -2122,7 +1970,7 @@
           <a:p>
             <a:fld id="{A310A56D-2A73-4214-BDEC-EE3DDD3E3C39}" type="datetimeFigureOut">
               <a:rPr lang="en-US" smtClean="0"/>
-              <a:t>8/2/2020</a:t>
+              <a:t>8/6/2020</a:t>
             </a:fld>
             <a:endParaRPr lang="en-US"/>
           </a:p>
@@ -2130,13 +1978,7 @@
       </p:sp>
       <p:sp>
         <p:nvSpPr>
-          <p:cNvPr id="3" name="Footer Placeholder 2">
-            <a:extLst>
-              <a:ext uri="{FF2B5EF4-FFF2-40B4-BE49-F238E27FC236}">
-                <a16:creationId xmlns:a16="http://schemas.microsoft.com/office/drawing/2014/main" id="{C0357CCC-E925-4B42-99FD-97F472DDFBD9}"/>
-              </a:ext>
-            </a:extLst>
-          </p:cNvPr>
+          <p:cNvPr id="3" name="Footer Placeholder 2"/>
           <p:cNvSpPr>
             <a:spLocks noGrp="1"/>
           </p:cNvSpPr>
@@ -2155,13 +1997,7 @@
       </p:sp>
       <p:sp>
         <p:nvSpPr>
-          <p:cNvPr id="4" name="Slide Number Placeholder 3">
-            <a:extLst>
-              <a:ext uri="{FF2B5EF4-FFF2-40B4-BE49-F238E27FC236}">
-                <a16:creationId xmlns:a16="http://schemas.microsoft.com/office/drawing/2014/main" id="{B7E239D1-33F9-4679-88FC-EB87BD099B01}"/>
-              </a:ext>
-            </a:extLst>
-          </p:cNvPr>
+          <p:cNvPr id="4" name="Slide Number Placeholder 3"/>
           <p:cNvSpPr>
             <a:spLocks noGrp="1"/>
           </p:cNvSpPr>
@@ -2185,7 +2021,7 @@
     </p:spTree>
     <p:extLst>
       <p:ext uri="{BB962C8B-B14F-4D97-AF65-F5344CB8AC3E}">
-        <p14:creationId xmlns:p14="http://schemas.microsoft.com/office/powerpoint/2010/main" val="2711904154"/>
+        <p14:creationId xmlns:p14="http://schemas.microsoft.com/office/powerpoint/2010/main" val="4144585791"/>
       </p:ext>
     </p:extLst>
   </p:cSld>
@@ -2214,13 +2050,7 @@
       </p:grpSpPr>
       <p:sp>
         <p:nvSpPr>
-          <p:cNvPr id="2" name="Title 1">
-            <a:extLst>
-              <a:ext uri="{FF2B5EF4-FFF2-40B4-BE49-F238E27FC236}">
-                <a16:creationId xmlns:a16="http://schemas.microsoft.com/office/drawing/2014/main" id="{056A3D37-F7A7-42C0-976B-D691140920AC}"/>
-              </a:ext>
-            </a:extLst>
-          </p:cNvPr>
+          <p:cNvPr id="2" name="Title 1"/>
           <p:cNvSpPr>
             <a:spLocks noGrp="1"/>
           </p:cNvSpPr>
@@ -2246,18 +2076,13 @@
               <a:rPr lang="en-US"/>
               <a:t>Click to edit Master title style</a:t>
             </a:r>
-          </a:p>
-        </p:txBody>
-      </p:sp>
-      <p:sp>
-        <p:nvSpPr>
-          <p:cNvPr id="3" name="Content Placeholder 2">
-            <a:extLst>
-              <a:ext uri="{FF2B5EF4-FFF2-40B4-BE49-F238E27FC236}">
-                <a16:creationId xmlns:a16="http://schemas.microsoft.com/office/drawing/2014/main" id="{7E9627D8-D3D5-447D-B892-B6CA435BA5C6}"/>
-              </a:ext>
-            </a:extLst>
-          </p:cNvPr>
+            <a:endParaRPr lang="en-US" dirty="0"/>
+          </a:p>
+        </p:txBody>
+      </p:sp>
+      <p:sp>
+        <p:nvSpPr>
+          <p:cNvPr id="3" name="Content Placeholder 2"/>
           <p:cNvSpPr>
             <a:spLocks noGrp="1"/>
           </p:cNvSpPr>
@@ -2336,18 +2161,13 @@
               <a:rPr lang="en-US"/>
               <a:t>Fifth level</a:t>
             </a:r>
-          </a:p>
-        </p:txBody>
-      </p:sp>
-      <p:sp>
-        <p:nvSpPr>
-          <p:cNvPr id="4" name="Text Placeholder 3">
-            <a:extLst>
-              <a:ext uri="{FF2B5EF4-FFF2-40B4-BE49-F238E27FC236}">
-                <a16:creationId xmlns:a16="http://schemas.microsoft.com/office/drawing/2014/main" id="{76D0E9DF-EB8A-4B8A-A1DC-CED185D370C6}"/>
-              </a:ext>
-            </a:extLst>
-          </p:cNvPr>
+            <a:endParaRPr lang="en-US" dirty="0"/>
+          </a:p>
+        </p:txBody>
+      </p:sp>
+      <p:sp>
+        <p:nvSpPr>
+          <p:cNvPr id="4" name="Text Placeholder 3"/>
           <p:cNvSpPr>
             <a:spLocks noGrp="1"/>
           </p:cNvSpPr>
@@ -2412,13 +2232,7 @@
       </p:sp>
       <p:sp>
         <p:nvSpPr>
-          <p:cNvPr id="5" name="Date Placeholder 4">
-            <a:extLst>
-              <a:ext uri="{FF2B5EF4-FFF2-40B4-BE49-F238E27FC236}">
-                <a16:creationId xmlns:a16="http://schemas.microsoft.com/office/drawing/2014/main" id="{D74E9423-F150-43D4-9A50-CD61824C319C}"/>
-              </a:ext>
-            </a:extLst>
-          </p:cNvPr>
+          <p:cNvPr id="5" name="Date Placeholder 4"/>
           <p:cNvSpPr>
             <a:spLocks noGrp="1"/>
           </p:cNvSpPr>
@@ -2433,7 +2247,7 @@
           <a:p>
             <a:fld id="{A310A56D-2A73-4214-BDEC-EE3DDD3E3C39}" type="datetimeFigureOut">
               <a:rPr lang="en-US" smtClean="0"/>
-              <a:t>8/2/2020</a:t>
+              <a:t>8/6/2020</a:t>
             </a:fld>
             <a:endParaRPr lang="en-US"/>
           </a:p>
@@ -2441,13 +2255,7 @@
       </p:sp>
       <p:sp>
         <p:nvSpPr>
-          <p:cNvPr id="6" name="Footer Placeholder 5">
-            <a:extLst>
-              <a:ext uri="{FF2B5EF4-FFF2-40B4-BE49-F238E27FC236}">
-                <a16:creationId xmlns:a16="http://schemas.microsoft.com/office/drawing/2014/main" id="{10BC7423-B064-4F26-9301-59F76386971B}"/>
-              </a:ext>
-            </a:extLst>
-          </p:cNvPr>
+          <p:cNvPr id="6" name="Footer Placeholder 5"/>
           <p:cNvSpPr>
             <a:spLocks noGrp="1"/>
           </p:cNvSpPr>
@@ -2466,13 +2274,7 @@
       </p:sp>
       <p:sp>
         <p:nvSpPr>
-          <p:cNvPr id="7" name="Slide Number Placeholder 6">
-            <a:extLst>
-              <a:ext uri="{FF2B5EF4-FFF2-40B4-BE49-F238E27FC236}">
-                <a16:creationId xmlns:a16="http://schemas.microsoft.com/office/drawing/2014/main" id="{FB716EFD-208B-473D-A9B8-0F112B0F1FDC}"/>
-              </a:ext>
-            </a:extLst>
-          </p:cNvPr>
+          <p:cNvPr id="7" name="Slide Number Placeholder 6"/>
           <p:cNvSpPr>
             <a:spLocks noGrp="1"/>
           </p:cNvSpPr>
@@ -2496,7 +2298,7 @@
     </p:spTree>
     <p:extLst>
       <p:ext uri="{BB962C8B-B14F-4D97-AF65-F5344CB8AC3E}">
-        <p14:creationId xmlns:p14="http://schemas.microsoft.com/office/powerpoint/2010/main" val="2870824990"/>
+        <p14:creationId xmlns:p14="http://schemas.microsoft.com/office/powerpoint/2010/main" val="2670578361"/>
       </p:ext>
     </p:extLst>
   </p:cSld>
@@ -2525,13 +2327,7 @@
       </p:grpSpPr>
       <p:sp>
         <p:nvSpPr>
-          <p:cNvPr id="2" name="Title 1">
-            <a:extLst>
-              <a:ext uri="{FF2B5EF4-FFF2-40B4-BE49-F238E27FC236}">
-                <a16:creationId xmlns:a16="http://schemas.microsoft.com/office/drawing/2014/main" id="{91AF718E-7D86-4EC1-9F87-F627D759293C}"/>
-              </a:ext>
-            </a:extLst>
-          </p:cNvPr>
+          <p:cNvPr id="2" name="Title 1"/>
           <p:cNvSpPr>
             <a:spLocks noGrp="1"/>
           </p:cNvSpPr>
@@ -2557,20 +2353,15 @@
               <a:rPr lang="en-US"/>
               <a:t>Click to edit Master title style</a:t>
             </a:r>
-          </a:p>
-        </p:txBody>
-      </p:sp>
-      <p:sp>
-        <p:nvSpPr>
-          <p:cNvPr id="3" name="Picture Placeholder 2">
-            <a:extLst>
-              <a:ext uri="{FF2B5EF4-FFF2-40B4-BE49-F238E27FC236}">
-                <a16:creationId xmlns:a16="http://schemas.microsoft.com/office/drawing/2014/main" id="{FCDD381D-FFF2-474A-AFA7-339A533CAD79}"/>
-              </a:ext>
-            </a:extLst>
-          </p:cNvPr>
-          <p:cNvSpPr>
-            <a:spLocks noGrp="1"/>
+            <a:endParaRPr lang="en-US" dirty="0"/>
+          </a:p>
+        </p:txBody>
+      </p:sp>
+      <p:sp>
+        <p:nvSpPr>
+          <p:cNvPr id="3" name="Picture Placeholder 2"/>
+          <p:cNvSpPr>
+            <a:spLocks noGrp="1" noChangeAspect="1"/>
           </p:cNvSpPr>
           <p:nvPr>
             <p:ph type="pic" idx="1"/>
@@ -2583,7 +2374,7 @@
           </a:xfrm>
         </p:spPr>
         <p:txBody>
-          <a:bodyPr/>
+          <a:bodyPr anchor="t"/>
           <a:lstStyle>
             <a:lvl1pPr marL="0" indent="0">
               <a:buNone/>
@@ -2623,19 +2414,17 @@
             </a:lvl9pPr>
           </a:lstStyle>
           <a:p>
-            <a:endParaRPr lang="en-US"/>
-          </a:p>
-        </p:txBody>
-      </p:sp>
-      <p:sp>
-        <p:nvSpPr>
-          <p:cNvPr id="4" name="Text Placeholder 3">
-            <a:extLst>
-              <a:ext uri="{FF2B5EF4-FFF2-40B4-BE49-F238E27FC236}">
-                <a16:creationId xmlns:a16="http://schemas.microsoft.com/office/drawing/2014/main" id="{306C1F05-2656-4D1E-9EE6-127D90686986}"/>
-              </a:ext>
-            </a:extLst>
-          </p:cNvPr>
+            <a:r>
+              <a:rPr lang="en-US"/>
+              <a:t>Click icon to add picture</a:t>
+            </a:r>
+            <a:endParaRPr lang="en-US" dirty="0"/>
+          </a:p>
+        </p:txBody>
+      </p:sp>
+      <p:sp>
+        <p:nvSpPr>
+          <p:cNvPr id="4" name="Text Placeholder 3"/>
           <p:cNvSpPr>
             <a:spLocks noGrp="1"/>
           </p:cNvSpPr>
@@ -2700,13 +2489,7 @@
       </p:sp>
       <p:sp>
         <p:nvSpPr>
-          <p:cNvPr id="5" name="Date Placeholder 4">
-            <a:extLst>
-              <a:ext uri="{FF2B5EF4-FFF2-40B4-BE49-F238E27FC236}">
-                <a16:creationId xmlns:a16="http://schemas.microsoft.com/office/drawing/2014/main" id="{1644636E-3F07-4D3B-9865-40840C8F5EF8}"/>
-              </a:ext>
-            </a:extLst>
-          </p:cNvPr>
+          <p:cNvPr id="5" name="Date Placeholder 4"/>
           <p:cNvSpPr>
             <a:spLocks noGrp="1"/>
           </p:cNvSpPr>
@@ -2721,7 +2504,7 @@
           <a:p>
             <a:fld id="{A310A56D-2A73-4214-BDEC-EE3DDD3E3C39}" type="datetimeFigureOut">
               <a:rPr lang="en-US" smtClean="0"/>
-              <a:t>8/2/2020</a:t>
+              <a:t>8/6/2020</a:t>
             </a:fld>
             <a:endParaRPr lang="en-US"/>
           </a:p>
@@ -2729,13 +2512,7 @@
       </p:sp>
       <p:sp>
         <p:nvSpPr>
-          <p:cNvPr id="6" name="Footer Placeholder 5">
-            <a:extLst>
-              <a:ext uri="{FF2B5EF4-FFF2-40B4-BE49-F238E27FC236}">
-                <a16:creationId xmlns:a16="http://schemas.microsoft.com/office/drawing/2014/main" id="{9CBBA492-EF41-41F3-B29F-805C949E237C}"/>
-              </a:ext>
-            </a:extLst>
-          </p:cNvPr>
+          <p:cNvPr id="6" name="Footer Placeholder 5"/>
           <p:cNvSpPr>
             <a:spLocks noGrp="1"/>
           </p:cNvSpPr>
@@ -2754,13 +2531,7 @@
       </p:sp>
       <p:sp>
         <p:nvSpPr>
-          <p:cNvPr id="7" name="Slide Number Placeholder 6">
-            <a:extLst>
-              <a:ext uri="{FF2B5EF4-FFF2-40B4-BE49-F238E27FC236}">
-                <a16:creationId xmlns:a16="http://schemas.microsoft.com/office/drawing/2014/main" id="{74ACF48A-8C38-4E27-B190-5F2E34F10CAC}"/>
-              </a:ext>
-            </a:extLst>
-          </p:cNvPr>
+          <p:cNvPr id="7" name="Slide Number Placeholder 6"/>
           <p:cNvSpPr>
             <a:spLocks noGrp="1"/>
           </p:cNvSpPr>
@@ -2784,7 +2555,7 @@
     </p:spTree>
     <p:extLst>
       <p:ext uri="{BB962C8B-B14F-4D97-AF65-F5344CB8AC3E}">
-        <p14:creationId xmlns:p14="http://schemas.microsoft.com/office/powerpoint/2010/main" val="2653384798"/>
+        <p14:creationId xmlns:p14="http://schemas.microsoft.com/office/powerpoint/2010/main" val="3928579723"/>
       </p:ext>
     </p:extLst>
   </p:cSld>
@@ -2818,13 +2589,7 @@
       </p:grpSpPr>
       <p:sp>
         <p:nvSpPr>
-          <p:cNvPr id="2" name="Title Placeholder 1">
-            <a:extLst>
-              <a:ext uri="{FF2B5EF4-FFF2-40B4-BE49-F238E27FC236}">
-                <a16:creationId xmlns:a16="http://schemas.microsoft.com/office/drawing/2014/main" id="{5A42FF43-6D43-4DE9-BB46-05DC6C7B1303}"/>
-              </a:ext>
-            </a:extLst>
-          </p:cNvPr>
+          <p:cNvPr id="2" name="Title Placeholder 1"/>
           <p:cNvSpPr>
             <a:spLocks noGrp="1"/>
           </p:cNvSpPr>
@@ -2851,18 +2616,13 @@
               <a:rPr lang="en-US"/>
               <a:t>Click to edit Master title style</a:t>
             </a:r>
-          </a:p>
-        </p:txBody>
-      </p:sp>
-      <p:sp>
-        <p:nvSpPr>
-          <p:cNvPr id="3" name="Text Placeholder 2">
-            <a:extLst>
-              <a:ext uri="{FF2B5EF4-FFF2-40B4-BE49-F238E27FC236}">
-                <a16:creationId xmlns:a16="http://schemas.microsoft.com/office/drawing/2014/main" id="{5158150D-A4D9-4D50-88A2-C4164CC7E32D}"/>
-              </a:ext>
-            </a:extLst>
-          </p:cNvPr>
+            <a:endParaRPr lang="en-US" dirty="0"/>
+          </a:p>
+        </p:txBody>
+      </p:sp>
+      <p:sp>
+        <p:nvSpPr>
+          <p:cNvPr id="3" name="Text Placeholder 2"/>
           <p:cNvSpPr>
             <a:spLocks noGrp="1"/>
           </p:cNvSpPr>
@@ -2918,18 +2678,13 @@
               <a:rPr lang="en-US"/>
               <a:t>Fifth level</a:t>
             </a:r>
-          </a:p>
-        </p:txBody>
-      </p:sp>
-      <p:sp>
-        <p:nvSpPr>
-          <p:cNvPr id="4" name="Date Placeholder 3">
-            <a:extLst>
-              <a:ext uri="{FF2B5EF4-FFF2-40B4-BE49-F238E27FC236}">
-                <a16:creationId xmlns:a16="http://schemas.microsoft.com/office/drawing/2014/main" id="{9698B9CB-EA40-406D-8E27-843DA78FA209}"/>
-              </a:ext>
-            </a:extLst>
-          </p:cNvPr>
+            <a:endParaRPr lang="en-US" dirty="0"/>
+          </a:p>
+        </p:txBody>
+      </p:sp>
+      <p:sp>
+        <p:nvSpPr>
+          <p:cNvPr id="4" name="Date Placeholder 3"/>
           <p:cNvSpPr>
             <a:spLocks noGrp="1"/>
           </p:cNvSpPr>
@@ -2962,7 +2717,7 @@
           <a:p>
             <a:fld id="{A310A56D-2A73-4214-BDEC-EE3DDD3E3C39}" type="datetimeFigureOut">
               <a:rPr lang="en-US" smtClean="0"/>
-              <a:t>8/2/2020</a:t>
+              <a:t>8/6/2020</a:t>
             </a:fld>
             <a:endParaRPr lang="en-US"/>
           </a:p>
@@ -2970,13 +2725,7 @@
       </p:sp>
       <p:sp>
         <p:nvSpPr>
-          <p:cNvPr id="5" name="Footer Placeholder 4">
-            <a:extLst>
-              <a:ext uri="{FF2B5EF4-FFF2-40B4-BE49-F238E27FC236}">
-                <a16:creationId xmlns:a16="http://schemas.microsoft.com/office/drawing/2014/main" id="{258F0A26-C4BF-4C4B-B1ED-875CF6DE8BD7}"/>
-              </a:ext>
-            </a:extLst>
-          </p:cNvPr>
+          <p:cNvPr id="5" name="Footer Placeholder 4"/>
           <p:cNvSpPr>
             <a:spLocks noGrp="1"/>
           </p:cNvSpPr>
@@ -3013,13 +2762,7 @@
       </p:sp>
       <p:sp>
         <p:nvSpPr>
-          <p:cNvPr id="6" name="Slide Number Placeholder 5">
-            <a:extLst>
-              <a:ext uri="{FF2B5EF4-FFF2-40B4-BE49-F238E27FC236}">
-                <a16:creationId xmlns:a16="http://schemas.microsoft.com/office/drawing/2014/main" id="{5E95A3B3-D759-4789-87C5-8A32B91B2D73}"/>
-              </a:ext>
-            </a:extLst>
-          </p:cNvPr>
+          <p:cNvPr id="6" name="Slide Number Placeholder 5"/>
           <p:cNvSpPr>
             <a:spLocks noGrp="1"/>
           </p:cNvSpPr>
@@ -3061,23 +2804,23 @@
     </p:spTree>
     <p:extLst>
       <p:ext uri="{BB962C8B-B14F-4D97-AF65-F5344CB8AC3E}">
-        <p14:creationId xmlns:p14="http://schemas.microsoft.com/office/powerpoint/2010/main" val="1736135876"/>
+        <p14:creationId xmlns:p14="http://schemas.microsoft.com/office/powerpoint/2010/main" val="2161449250"/>
       </p:ext>
     </p:extLst>
   </p:cSld>
   <p:clrMap bg1="lt1" tx1="dk1" bg2="lt2" tx2="dk2" accent1="accent1" accent2="accent2" accent3="accent3" accent4="accent4" accent5="accent5" accent6="accent6" hlink="hlink" folHlink="folHlink"/>
   <p:sldLayoutIdLst>
-    <p:sldLayoutId id="2147483649" r:id="rId1"/>
-    <p:sldLayoutId id="2147483650" r:id="rId2"/>
-    <p:sldLayoutId id="2147483651" r:id="rId3"/>
-    <p:sldLayoutId id="2147483652" r:id="rId4"/>
-    <p:sldLayoutId id="2147483653" r:id="rId5"/>
-    <p:sldLayoutId id="2147483654" r:id="rId6"/>
-    <p:sldLayoutId id="2147483655" r:id="rId7"/>
-    <p:sldLayoutId id="2147483656" r:id="rId8"/>
-    <p:sldLayoutId id="2147483657" r:id="rId9"/>
-    <p:sldLayoutId id="2147483658" r:id="rId10"/>
-    <p:sldLayoutId id="2147483659" r:id="rId11"/>
+    <p:sldLayoutId id="2147483673" r:id="rId1"/>
+    <p:sldLayoutId id="2147483674" r:id="rId2"/>
+    <p:sldLayoutId id="2147483675" r:id="rId3"/>
+    <p:sldLayoutId id="2147483676" r:id="rId4"/>
+    <p:sldLayoutId id="2147483677" r:id="rId5"/>
+    <p:sldLayoutId id="2147483678" r:id="rId6"/>
+    <p:sldLayoutId id="2147483679" r:id="rId7"/>
+    <p:sldLayoutId id="2147483680" r:id="rId8"/>
+    <p:sldLayoutId id="2147483681" r:id="rId9"/>
+    <p:sldLayoutId id="2147483682" r:id="rId10"/>
+    <p:sldLayoutId id="2147483683" r:id="rId11"/>
   </p:sldLayoutIdLst>
   <p:txStyles>
     <p:titleStyle>
@@ -3467,6 +3210,140 @@
           <p:cNvPr id="2" name="Title 1">
             <a:extLst>
               <a:ext uri="{FF2B5EF4-FFF2-40B4-BE49-F238E27FC236}">
+                <a16:creationId xmlns:a16="http://schemas.microsoft.com/office/drawing/2014/main" id="{450A55ED-B344-4B90-8E54-3FA7DCD06411}"/>
+              </a:ext>
+            </a:extLst>
+          </p:cNvPr>
+          <p:cNvSpPr>
+            <a:spLocks noGrp="1"/>
+          </p:cNvSpPr>
+          <p:nvPr>
+            <p:ph type="title"/>
+          </p:nvPr>
+        </p:nvSpPr>
+        <p:spPr/>
+        <p:txBody>
+          <a:bodyPr/>
+          <a:lstStyle/>
+          <a:p>
+            <a:r>
+              <a:rPr lang="en-US" dirty="0"/>
+              <a:t>What We Are Going To Answer</a:t>
+            </a:r>
+          </a:p>
+        </p:txBody>
+      </p:sp>
+      <p:sp>
+        <p:nvSpPr>
+          <p:cNvPr id="3" name="Content Placeholder 2">
+            <a:extLst>
+              <a:ext uri="{FF2B5EF4-FFF2-40B4-BE49-F238E27FC236}">
+                <a16:creationId xmlns:a16="http://schemas.microsoft.com/office/drawing/2014/main" id="{ACE8AE74-60CA-4CC0-B9B2-DAFCEB00217C}"/>
+              </a:ext>
+            </a:extLst>
+          </p:cNvPr>
+          <p:cNvSpPr>
+            <a:spLocks noGrp="1"/>
+          </p:cNvSpPr>
+          <p:nvPr>
+            <p:ph idx="1"/>
+          </p:nvPr>
+        </p:nvSpPr>
+        <p:spPr/>
+        <p:txBody>
+          <a:bodyPr>
+            <a:normAutofit fontScale="92500" lnSpcReduction="20000"/>
+          </a:bodyPr>
+          <a:lstStyle/>
+          <a:p>
+            <a:r>
+              <a:rPr lang="en-US" dirty="0"/>
+              <a:t>Question 1:</a:t>
+            </a:r>
+          </a:p>
+          <a:p>
+            <a:pPr lvl="1"/>
+            <a:r>
+              <a:rPr lang="en-US" dirty="0"/>
+              <a:t>If I have space to add an additional room, what should I put in the space?</a:t>
+            </a:r>
+          </a:p>
+          <a:p>
+            <a:r>
+              <a:rPr lang="en-US" dirty="0"/>
+              <a:t>Question 2:</a:t>
+            </a:r>
+          </a:p>
+          <a:p>
+            <a:pPr lvl="1"/>
+            <a:r>
+              <a:rPr lang="en-US" dirty="0"/>
+              <a:t>I'm looking to buy a house in King County. I like a lot of space and don't really care about the neighborhood. What area should I look in to get the most space for my money if I can only spend 400,000 dollars.</a:t>
+            </a:r>
+          </a:p>
+          <a:p>
+            <a:r>
+              <a:rPr lang="en-US" dirty="0"/>
+              <a:t>Question 3:</a:t>
+            </a:r>
+          </a:p>
+          <a:p>
+            <a:pPr lvl="1"/>
+            <a:r>
+              <a:rPr lang="en-US" dirty="0"/>
+              <a:t>My house is styled from back in the seventies. I'm trying to sell it and want to know if it's worth upgrading.</a:t>
+            </a:r>
+          </a:p>
+          <a:p>
+            <a:r>
+              <a:rPr lang="en-US" dirty="0"/>
+              <a:t>Question 4:</a:t>
+            </a:r>
+          </a:p>
+          <a:p>
+            <a:pPr lvl="1"/>
+            <a:r>
+              <a:rPr lang="en-US" dirty="0"/>
+              <a:t>I’m trying to sell my house but I don't have much money for renovations. My house was built in the 80's and I haven't done much in the way of major renovations. What should I do?</a:t>
+            </a:r>
+          </a:p>
+        </p:txBody>
+      </p:sp>
+    </p:spTree>
+    <p:extLst>
+      <p:ext uri="{BB962C8B-B14F-4D97-AF65-F5344CB8AC3E}">
+        <p14:creationId xmlns:p14="http://schemas.microsoft.com/office/powerpoint/2010/main" val="470197049"/>
+      </p:ext>
+    </p:extLst>
+  </p:cSld>
+  <p:clrMapOvr>
+    <a:masterClrMapping/>
+  </p:clrMapOvr>
+</p:sld>
+</file>
+
+<file path=ppt/slides/slide3.xml><?xml version="1.0" encoding="utf-8"?>
+<p:sld xmlns:a="http://schemas.openxmlformats.org/drawingml/2006/main" xmlns:r="http://schemas.openxmlformats.org/officeDocument/2006/relationships" xmlns:p="http://schemas.openxmlformats.org/presentationml/2006/main">
+  <p:cSld>
+    <p:spTree>
+      <p:nvGrpSpPr>
+        <p:cNvPr id="1" name=""/>
+        <p:cNvGrpSpPr/>
+        <p:nvPr/>
+      </p:nvGrpSpPr>
+      <p:grpSpPr>
+        <a:xfrm>
+          <a:off x="0" y="0"/>
+          <a:ext cx="0" cy="0"/>
+          <a:chOff x="0" y="0"/>
+          <a:chExt cx="0" cy="0"/>
+        </a:xfrm>
+      </p:grpSpPr>
+      <p:sp>
+        <p:nvSpPr>
+          <p:cNvPr id="2" name="Title 1">
+            <a:extLst>
+              <a:ext uri="{FF2B5EF4-FFF2-40B4-BE49-F238E27FC236}">
                 <a16:creationId xmlns:a16="http://schemas.microsoft.com/office/drawing/2014/main" id="{A34B8A40-B7D8-4B6E-8F77-60C268CBF4ED}"/>
               </a:ext>
             </a:extLst>
@@ -3483,35 +3360,48 @@
           <a:bodyPr/>
           <a:lstStyle/>
           <a:p>
-            <a:endParaRPr lang="en-US"/>
-          </a:p>
-        </p:txBody>
-      </p:sp>
-      <p:sp>
-        <p:nvSpPr>
-          <p:cNvPr id="3" name="Content Placeholder 2">
+            <a:r>
+              <a:rPr lang="en-US" dirty="0"/>
+              <a:t>Question 1:</a:t>
+            </a:r>
+          </a:p>
+        </p:txBody>
+      </p:sp>
+      <p:pic>
+        <p:nvPicPr>
+          <p:cNvPr id="5" name="Content Placeholder 4" descr="A screenshot of a cell phone&#10;&#10;Description automatically generated">
             <a:extLst>
               <a:ext uri="{FF2B5EF4-FFF2-40B4-BE49-F238E27FC236}">
-                <a16:creationId xmlns:a16="http://schemas.microsoft.com/office/drawing/2014/main" id="{788DC7C3-148B-4450-96FA-03F96F3D79C9}"/>
+                <a16:creationId xmlns:a16="http://schemas.microsoft.com/office/drawing/2014/main" id="{38766B99-6144-4199-9937-F7AA9E078255}"/>
               </a:ext>
             </a:extLst>
           </p:cNvPr>
-          <p:cNvSpPr>
-            <a:spLocks noGrp="1"/>
-          </p:cNvSpPr>
+          <p:cNvPicPr>
+            <a:picLocks noGrp="1" noChangeAspect="1"/>
+          </p:cNvPicPr>
           <p:nvPr>
             <p:ph idx="1"/>
           </p:nvPr>
-        </p:nvSpPr>
-        <p:spPr/>
-        <p:txBody>
-          <a:bodyPr/>
-          <a:lstStyle/>
-          <a:p>
-            <a:endParaRPr lang="en-US"/>
-          </a:p>
-        </p:txBody>
-      </p:sp>
+        </p:nvPicPr>
+        <p:blipFill>
+          <a:blip r:embed="rId2">
+            <a:extLst>
+              <a:ext uri="{28A0092B-C50C-407E-A947-70E740481C1C}">
+                <a14:useLocalDpi xmlns:a14="http://schemas.microsoft.com/office/drawing/2010/main" val="0"/>
+              </a:ext>
+            </a:extLst>
+          </a:blip>
+          <a:stretch>
+            <a:fillRect/>
+          </a:stretch>
+        </p:blipFill>
+        <p:spPr>
+          <a:xfrm>
+            <a:off x="5493342" y="478363"/>
+            <a:ext cx="6012118" cy="5693299"/>
+          </a:xfrm>
+        </p:spPr>
+      </p:pic>
     </p:spTree>
     <p:extLst>
       <p:ext uri="{BB962C8B-B14F-4D97-AF65-F5344CB8AC3E}">
@@ -3525,10 +3415,100 @@
 </p:sld>
 </file>
 
+<file path=ppt/slides/slide4.xml><?xml version="1.0" encoding="utf-8"?>
+<p:sld xmlns:a="http://schemas.openxmlformats.org/drawingml/2006/main" xmlns:r="http://schemas.openxmlformats.org/officeDocument/2006/relationships" xmlns:p="http://schemas.openxmlformats.org/presentationml/2006/main">
+  <p:cSld>
+    <p:spTree>
+      <p:nvGrpSpPr>
+        <p:cNvPr id="1" name=""/>
+        <p:cNvGrpSpPr/>
+        <p:nvPr/>
+      </p:nvGrpSpPr>
+      <p:grpSpPr>
+        <a:xfrm>
+          <a:off x="0" y="0"/>
+          <a:ext cx="0" cy="0"/>
+          <a:chOff x="0" y="0"/>
+          <a:chExt cx="0" cy="0"/>
+        </a:xfrm>
+      </p:grpSpPr>
+      <p:sp>
+        <p:nvSpPr>
+          <p:cNvPr id="2" name="Title 1">
+            <a:extLst>
+              <a:ext uri="{FF2B5EF4-FFF2-40B4-BE49-F238E27FC236}">
+                <a16:creationId xmlns:a16="http://schemas.microsoft.com/office/drawing/2014/main" id="{5654E1FA-C920-4851-BD5D-702F18C9B5F3}"/>
+              </a:ext>
+            </a:extLst>
+          </p:cNvPr>
+          <p:cNvSpPr>
+            <a:spLocks noGrp="1"/>
+          </p:cNvSpPr>
+          <p:nvPr>
+            <p:ph type="title"/>
+          </p:nvPr>
+        </p:nvSpPr>
+        <p:spPr/>
+        <p:txBody>
+          <a:bodyPr/>
+          <a:lstStyle/>
+          <a:p>
+            <a:endParaRPr lang="en-US"/>
+          </a:p>
+        </p:txBody>
+      </p:sp>
+      <p:pic>
+        <p:nvPicPr>
+          <p:cNvPr id="5" name="Content Placeholder 4">
+            <a:extLst>
+              <a:ext uri="{FF2B5EF4-FFF2-40B4-BE49-F238E27FC236}">
+                <a16:creationId xmlns:a16="http://schemas.microsoft.com/office/drawing/2014/main" id="{1481E1AB-C705-4D63-A70E-F14EE30A4318}"/>
+              </a:ext>
+            </a:extLst>
+          </p:cNvPr>
+          <p:cNvPicPr>
+            <a:picLocks noGrp="1" noChangeAspect="1"/>
+          </p:cNvPicPr>
+          <p:nvPr>
+            <p:ph idx="1"/>
+          </p:nvPr>
+        </p:nvPicPr>
+        <p:blipFill>
+          <a:blip r:embed="rId2">
+            <a:extLst>
+              <a:ext uri="{28A0092B-C50C-407E-A947-70E740481C1C}">
+                <a14:useLocalDpi xmlns:a14="http://schemas.microsoft.com/office/drawing/2010/main" val="0"/>
+              </a:ext>
+            </a:extLst>
+          </a:blip>
+          <a:stretch>
+            <a:fillRect/>
+          </a:stretch>
+        </p:blipFill>
+        <p:spPr>
+          <a:xfrm>
+            <a:off x="64125" y="35138"/>
+            <a:ext cx="6407696" cy="6698574"/>
+          </a:xfrm>
+        </p:spPr>
+      </p:pic>
+    </p:spTree>
+    <p:extLst>
+      <p:ext uri="{BB962C8B-B14F-4D97-AF65-F5344CB8AC3E}">
+        <p14:creationId xmlns:p14="http://schemas.microsoft.com/office/powerpoint/2010/main" val="1022739119"/>
+      </p:ext>
+    </p:extLst>
+  </p:cSld>
+  <p:clrMapOvr>
+    <a:masterClrMapping/>
+  </p:clrMapOvr>
+</p:sld>
+</file>
+
 <file path=ppt/theme/theme1.xml><?xml version="1.0" encoding="utf-8"?>
 <a:theme xmlns:a="http://schemas.openxmlformats.org/drawingml/2006/main" name="Office Theme">
   <a:themeElements>
-    <a:clrScheme name="Office">
+    <a:clrScheme name="Office Theme">
       <a:dk1>
         <a:sysClr val="windowText" lastClr="000000"/>
       </a:dk1>
@@ -3566,7 +3546,7 @@
         <a:srgbClr val="954F72"/>
       </a:folHlink>
     </a:clrScheme>
-    <a:fontScheme name="Office">
+    <a:fontScheme name="Office Theme">
       <a:majorFont>
         <a:latin typeface="Calibri Light" panose="020F0302020204030204"/>
         <a:ea typeface=""/>
@@ -3601,23 +3581,6 @@
         <a:font script="Viet" typeface="Times New Roman"/>
         <a:font script="Uigh" typeface="Microsoft Uighur"/>
         <a:font script="Geor" typeface="Sylfaen"/>
-        <a:font script="Armn" typeface="Arial"/>
-        <a:font script="Bugi" typeface="Leelawadee UI"/>
-        <a:font script="Bopo" typeface="Microsoft JhengHei"/>
-        <a:font script="Java" typeface="Javanese Text"/>
-        <a:font script="Lisu" typeface="Segoe UI"/>
-        <a:font script="Mymr" typeface="Myanmar Text"/>
-        <a:font script="Nkoo" typeface="Ebrima"/>
-        <a:font script="Olck" typeface="Nirmala UI"/>
-        <a:font script="Osma" typeface="Ebrima"/>
-        <a:font script="Phag" typeface="Phagspa"/>
-        <a:font script="Syrn" typeface="Estrangelo Edessa"/>
-        <a:font script="Syrj" typeface="Estrangelo Edessa"/>
-        <a:font script="Syre" typeface="Estrangelo Edessa"/>
-        <a:font script="Sora" typeface="Nirmala UI"/>
-        <a:font script="Tale" typeface="Microsoft Tai Le"/>
-        <a:font script="Talu" typeface="Microsoft New Tai Lue"/>
-        <a:font script="Tfng" typeface="Ebrima"/>
       </a:majorFont>
       <a:minorFont>
         <a:latin typeface="Calibri" panose="020F0502020204030204"/>
@@ -3653,26 +3616,9 @@
         <a:font script="Viet" typeface="Arial"/>
         <a:font script="Uigh" typeface="Microsoft Uighur"/>
         <a:font script="Geor" typeface="Sylfaen"/>
-        <a:font script="Armn" typeface="Arial"/>
-        <a:font script="Bugi" typeface="Leelawadee UI"/>
-        <a:font script="Bopo" typeface="Microsoft JhengHei"/>
-        <a:font script="Java" typeface="Javanese Text"/>
-        <a:font script="Lisu" typeface="Segoe UI"/>
-        <a:font script="Mymr" typeface="Myanmar Text"/>
-        <a:font script="Nkoo" typeface="Ebrima"/>
-        <a:font script="Olck" typeface="Nirmala UI"/>
-        <a:font script="Osma" typeface="Ebrima"/>
-        <a:font script="Phag" typeface="Phagspa"/>
-        <a:font script="Syrn" typeface="Estrangelo Edessa"/>
-        <a:font script="Syrj" typeface="Estrangelo Edessa"/>
-        <a:font script="Syre" typeface="Estrangelo Edessa"/>
-        <a:font script="Sora" typeface="Nirmala UI"/>
-        <a:font script="Tale" typeface="Microsoft Tai Le"/>
-        <a:font script="Talu" typeface="Microsoft New Tai Lue"/>
-        <a:font script="Tfng" typeface="Ebrima"/>
       </a:minorFont>
     </a:fontScheme>
-    <a:fmtScheme name="Office">
+    <a:fmtScheme name="Office Theme">
       <a:fillStyleLst>
         <a:solidFill>
           <a:schemeClr val="phClr"/>

</xml_diff>